<commit_message>
Updated Demo 4 presentation
</commit_message>
<xml_diff>
--- a/Demo Presentations/FCC-Demo_4.pptx
+++ b/Demo Presentations/FCC-Demo_4.pptx
@@ -5,7 +5,7 @@
     <p:sldMasterId id="2147483708" r:id="rId1"/>
   </p:sldMasterIdLst>
   <p:notesMasterIdLst>
-    <p:notesMasterId r:id="rId20"/>
+    <p:notesMasterId r:id="rId22"/>
   </p:notesMasterIdLst>
   <p:sldIdLst>
     <p:sldId id="256" r:id="rId2"/>
@@ -14,18 +14,20 @@
     <p:sldId id="280" r:id="rId5"/>
     <p:sldId id="288" r:id="rId6"/>
     <p:sldId id="295" r:id="rId7"/>
-    <p:sldId id="301" r:id="rId8"/>
-    <p:sldId id="302" r:id="rId9"/>
-    <p:sldId id="294" r:id="rId10"/>
-    <p:sldId id="293" r:id="rId11"/>
-    <p:sldId id="299" r:id="rId12"/>
-    <p:sldId id="291" r:id="rId13"/>
-    <p:sldId id="292" r:id="rId14"/>
-    <p:sldId id="297" r:id="rId15"/>
-    <p:sldId id="298" r:id="rId16"/>
-    <p:sldId id="300" r:id="rId17"/>
-    <p:sldId id="271" r:id="rId18"/>
-    <p:sldId id="263" r:id="rId19"/>
+    <p:sldId id="304" r:id="rId8"/>
+    <p:sldId id="305" r:id="rId9"/>
+    <p:sldId id="301" r:id="rId10"/>
+    <p:sldId id="302" r:id="rId11"/>
+    <p:sldId id="294" r:id="rId12"/>
+    <p:sldId id="299" r:id="rId13"/>
+    <p:sldId id="293" r:id="rId14"/>
+    <p:sldId id="291" r:id="rId15"/>
+    <p:sldId id="292" r:id="rId16"/>
+    <p:sldId id="297" r:id="rId17"/>
+    <p:sldId id="298" r:id="rId18"/>
+    <p:sldId id="300" r:id="rId19"/>
+    <p:sldId id="271" r:id="rId20"/>
+    <p:sldId id="263" r:id="rId21"/>
   </p:sldIdLst>
   <p:sldSz cx="12192000" cy="6858000"/>
   <p:notesSz cx="6858000" cy="1371600"/>
@@ -137,7 +139,7 @@
   <p1510:revLst>
     <p1510:client id="{09A879D0-8940-4EDC-85E7-5BE98D99F4A2}" v="1016" dt="2019-09-27T03:24:28.269"/>
     <p1510:client id="{18497B3C-52DD-45BB-A68C-3CB3FE77681D}" v="167" dt="2019-10-10T20:57:47.297"/>
-    <p1510:client id="{19AE5E64-6B83-45AE-8AEA-B0195514AF00}" v="842" dt="2019-11-08T13:04:18.094"/>
+    <p1510:client id="{19AE5E64-6B83-45AE-8AEA-B0195514AF00}" v="843" dt="2019-11-08T13:23:48.798"/>
     <p1510:client id="{1C4C73BC-48BC-4E7F-B3C7-E7A84CAFF2FB}" v="127" dt="2019-10-11T14:37:05.587"/>
     <p1510:client id="{32A99EA7-25F9-4235-BCF8-143938EBCB06}" v="7" dt="2019-10-11T12:44:45.014"/>
     <p1510:client id="{620905DE-F01D-45BF-91F7-711277C6FCC2}" v="4" dt="2019-09-27T03:19:18.087"/>
@@ -157,7 +159,7 @@
     <p1510:client id="{A2293A4D-1290-41C0-81D3-3E3AE943E7F9}" v="88" dt="2019-10-11T14:35:42.343"/>
     <p1510:client id="{A2E8530C-F794-479F-BD14-C74FF0F1FA3C}" v="106" dt="2019-10-10T20:43:18.944"/>
     <p1510:client id="{A32BCFDC-9E8A-46B3-9888-2760E56C5BCD}" v="279" dt="2019-11-08T01:30:42.281"/>
-    <p1510:client id="{A8ACF2B7-83A1-42B3-8D88-5E0ECDFE63FE}" v="86" dt="2019-11-08T12:39:48.272"/>
+    <p1510:client id="{A8ACF2B7-83A1-42B3-8D88-5E0ECDFE63FE}" v="167" dt="2019-11-08T13:38:01.268"/>
     <p1510:client id="{AC8EDF94-B581-473C-87BB-61688AAD1B78}" v="132" dt="2019-10-08T21:02:20.289"/>
     <p1510:client id="{B0675208-F9D5-448F-BCA9-61810B890AD7}" v="9" dt="2019-09-27T11:51:20.058"/>
     <p1510:client id="{B67BB0D2-D386-4B7B-B931-5C2334B9BE32}" v="58" dt="2019-10-11T02:25:05.979"/>
@@ -2234,14 +2236,14 @@
             </a:lnSpc>
           </a:pPr>
           <a:r>
-            <a:rPr lang="en-US" dirty="0"/>
+            <a:rPr lang="en-US"/>
             <a:t> </a:t>
           </a:r>
           <a:r>
-            <a:rPr lang="en-US" u="none" dirty="0"/>
+            <a:rPr lang="en-US" u="none"/>
             <a:t>Concrete ShuffleWriter that ShuffleMapTask uses to write records into one single shuffle block data file when the task runs for a ShuffleDependency</a:t>
           </a:r>
-          <a:endParaRPr lang="en-US" u="sng" dirty="0">
+          <a:endParaRPr lang="en-US" u="sng">
             <a:latin typeface="Calibri Light" panose="020F0302020204030204"/>
           </a:endParaRPr>
         </a:p>
@@ -2868,14 +2870,14 @@
             <a:buNone/>
           </a:pPr>
           <a:r>
-            <a:rPr lang="en-US" sz="1100" kern="1200" dirty="0"/>
+            <a:rPr lang="en-US" sz="1100" kern="1200"/>
             <a:t> </a:t>
           </a:r>
           <a:r>
-            <a:rPr lang="en-US" sz="1100" u="none" kern="1200" dirty="0"/>
+            <a:rPr lang="en-US" sz="1100" u="none" kern="1200"/>
             <a:t>Concrete ShuffleWriter that ShuffleMapTask uses to write records into one single shuffle block data file when the task runs for a ShuffleDependency</a:t>
           </a:r>
-          <a:endParaRPr lang="en-US" sz="1100" u="sng" kern="1200" dirty="0">
+          <a:endParaRPr lang="en-US" sz="1100" u="sng" kern="1200">
             <a:latin typeface="Calibri Light" panose="020F0302020204030204"/>
           </a:endParaRPr>
         </a:p>
@@ -6047,7 +6049,7 @@
           <a:p>
             <a:fld id="{0056F46C-10DD-4BD5-82D5-2BDBF6A794D7}" type="slidenum">
               <a:rPr lang="en-US"/>
-              <a:t>11</a:t>
+              <a:t>8</a:t>
             </a:fld>
             <a:endParaRPr lang="en-US"/>
           </a:p>
@@ -6056,7 +6058,7 @@
     </p:spTree>
     <p:extLst>
       <p:ext uri="{BB962C8B-B14F-4D97-AF65-F5344CB8AC3E}">
-        <p14:creationId xmlns:p14="http://schemas.microsoft.com/office/powerpoint/2010/main" val="4045987814"/>
+        <p14:creationId xmlns:p14="http://schemas.microsoft.com/office/powerpoint/2010/main" val="1637494084"/>
       </p:ext>
     </p:extLst>
   </p:cSld>
@@ -6134,7 +6136,7 @@
           <a:p>
             <a:fld id="{0056F46C-10DD-4BD5-82D5-2BDBF6A794D7}" type="slidenum">
               <a:rPr lang="en-US"/>
-              <a:t>12</a:t>
+              <a:t>10</a:t>
             </a:fld>
             <a:endParaRPr lang="en-US"/>
           </a:p>
@@ -6143,7 +6145,7 @@
     </p:spTree>
     <p:extLst>
       <p:ext uri="{BB962C8B-B14F-4D97-AF65-F5344CB8AC3E}">
-        <p14:creationId xmlns:p14="http://schemas.microsoft.com/office/powerpoint/2010/main" val="2355446116"/>
+        <p14:creationId xmlns:p14="http://schemas.microsoft.com/office/powerpoint/2010/main" val="3021659947"/>
       </p:ext>
     </p:extLst>
   </p:cSld>
@@ -6230,7 +6232,7 @@
     </p:spTree>
     <p:extLst>
       <p:ext uri="{BB962C8B-B14F-4D97-AF65-F5344CB8AC3E}">
-        <p14:creationId xmlns:p14="http://schemas.microsoft.com/office/powerpoint/2010/main" val="412023489"/>
+        <p14:creationId xmlns:p14="http://schemas.microsoft.com/office/powerpoint/2010/main" val="4045987814"/>
       </p:ext>
     </p:extLst>
   </p:cSld>
@@ -6308,7 +6310,181 @@
           <a:p>
             <a:fld id="{0056F46C-10DD-4BD5-82D5-2BDBF6A794D7}" type="slidenum">
               <a:rPr lang="en-US"/>
-              <a:t>16</a:t>
+              <a:t>12</a:t>
+            </a:fld>
+            <a:endParaRPr lang="en-US"/>
+          </a:p>
+        </p:txBody>
+      </p:sp>
+    </p:spTree>
+    <p:extLst>
+      <p:ext uri="{BB962C8B-B14F-4D97-AF65-F5344CB8AC3E}">
+        <p14:creationId xmlns:p14="http://schemas.microsoft.com/office/powerpoint/2010/main" val="2355446116"/>
+      </p:ext>
+    </p:extLst>
+  </p:cSld>
+  <p:clrMapOvr>
+    <a:masterClrMapping/>
+  </p:clrMapOvr>
+</p:notes>
+</file>
+
+<file path=ppt/notesSlides/notesSlide14.xml><?xml version="1.0" encoding="utf-8"?>
+<p:notes xmlns:a="http://schemas.openxmlformats.org/drawingml/2006/main" xmlns:r="http://schemas.openxmlformats.org/officeDocument/2006/relationships" xmlns:p="http://schemas.openxmlformats.org/presentationml/2006/main">
+  <p:cSld>
+    <p:spTree>
+      <p:nvGrpSpPr>
+        <p:cNvPr id="1" name=""/>
+        <p:cNvGrpSpPr/>
+        <p:nvPr/>
+      </p:nvGrpSpPr>
+      <p:grpSpPr>
+        <a:xfrm>
+          <a:off x="0" y="0"/>
+          <a:ext cx="0" cy="0"/>
+          <a:chOff x="0" y="0"/>
+          <a:chExt cx="0" cy="0"/>
+        </a:xfrm>
+      </p:grpSpPr>
+      <p:sp>
+        <p:nvSpPr>
+          <p:cNvPr id="2" name="幻灯片图像占位符 1"/>
+          <p:cNvSpPr>
+            <a:spLocks noGrp="1" noRot="1" noChangeAspect="1"/>
+          </p:cNvSpPr>
+          <p:nvPr>
+            <p:ph type="sldImg"/>
+          </p:nvPr>
+        </p:nvSpPr>
+        <p:spPr/>
+      </p:sp>
+      <p:sp>
+        <p:nvSpPr>
+          <p:cNvPr id="3" name="备注占位符 2"/>
+          <p:cNvSpPr>
+            <a:spLocks noGrp="1"/>
+          </p:cNvSpPr>
+          <p:nvPr>
+            <p:ph type="body" idx="1"/>
+          </p:nvPr>
+        </p:nvSpPr>
+        <p:spPr/>
+        <p:txBody>
+          <a:bodyPr/>
+          <a:lstStyle/>
+          <a:p>
+            <a:endParaRPr lang="en-US" altLang="zh-CN">
+              <a:ea typeface="等线"/>
+              <a:cs typeface="Calibri"/>
+            </a:endParaRPr>
+          </a:p>
+        </p:txBody>
+      </p:sp>
+      <p:sp>
+        <p:nvSpPr>
+          <p:cNvPr id="4" name="灯片编号占位符 3"/>
+          <p:cNvSpPr>
+            <a:spLocks noGrp="1"/>
+          </p:cNvSpPr>
+          <p:nvPr>
+            <p:ph type="sldNum" sz="quarter" idx="5"/>
+          </p:nvPr>
+        </p:nvSpPr>
+        <p:spPr/>
+        <p:txBody>
+          <a:bodyPr/>
+          <a:lstStyle/>
+          <a:p>
+            <a:fld id="{0056F46C-10DD-4BD5-82D5-2BDBF6A794D7}" type="slidenum">
+              <a:rPr lang="en-US"/>
+              <a:t>13</a:t>
+            </a:fld>
+            <a:endParaRPr lang="en-US"/>
+          </a:p>
+        </p:txBody>
+      </p:sp>
+    </p:spTree>
+    <p:extLst>
+      <p:ext uri="{BB962C8B-B14F-4D97-AF65-F5344CB8AC3E}">
+        <p14:creationId xmlns:p14="http://schemas.microsoft.com/office/powerpoint/2010/main" val="412023489"/>
+      </p:ext>
+    </p:extLst>
+  </p:cSld>
+  <p:clrMapOvr>
+    <a:masterClrMapping/>
+  </p:clrMapOvr>
+</p:notes>
+</file>
+
+<file path=ppt/notesSlides/notesSlide15.xml><?xml version="1.0" encoding="utf-8"?>
+<p:notes xmlns:a="http://schemas.openxmlformats.org/drawingml/2006/main" xmlns:r="http://schemas.openxmlformats.org/officeDocument/2006/relationships" xmlns:p="http://schemas.openxmlformats.org/presentationml/2006/main">
+  <p:cSld>
+    <p:spTree>
+      <p:nvGrpSpPr>
+        <p:cNvPr id="1" name=""/>
+        <p:cNvGrpSpPr/>
+        <p:nvPr/>
+      </p:nvGrpSpPr>
+      <p:grpSpPr>
+        <a:xfrm>
+          <a:off x="0" y="0"/>
+          <a:ext cx="0" cy="0"/>
+          <a:chOff x="0" y="0"/>
+          <a:chExt cx="0" cy="0"/>
+        </a:xfrm>
+      </p:grpSpPr>
+      <p:sp>
+        <p:nvSpPr>
+          <p:cNvPr id="2" name="幻灯片图像占位符 1"/>
+          <p:cNvSpPr>
+            <a:spLocks noGrp="1" noRot="1" noChangeAspect="1"/>
+          </p:cNvSpPr>
+          <p:nvPr>
+            <p:ph type="sldImg"/>
+          </p:nvPr>
+        </p:nvSpPr>
+        <p:spPr/>
+      </p:sp>
+      <p:sp>
+        <p:nvSpPr>
+          <p:cNvPr id="3" name="备注占位符 2"/>
+          <p:cNvSpPr>
+            <a:spLocks noGrp="1"/>
+          </p:cNvSpPr>
+          <p:nvPr>
+            <p:ph type="body" idx="1"/>
+          </p:nvPr>
+        </p:nvSpPr>
+        <p:spPr/>
+        <p:txBody>
+          <a:bodyPr/>
+          <a:lstStyle/>
+          <a:p>
+            <a:endParaRPr lang="en-US" altLang="zh-CN">
+              <a:ea typeface="等线"/>
+              <a:cs typeface="Calibri"/>
+            </a:endParaRPr>
+          </a:p>
+        </p:txBody>
+      </p:sp>
+      <p:sp>
+        <p:nvSpPr>
+          <p:cNvPr id="4" name="灯片编号占位符 3"/>
+          <p:cNvSpPr>
+            <a:spLocks noGrp="1"/>
+          </p:cNvSpPr>
+          <p:nvPr>
+            <p:ph type="sldNum" sz="quarter" idx="5"/>
+          </p:nvPr>
+        </p:nvSpPr>
+        <p:spPr/>
+        <p:txBody>
+          <a:bodyPr/>
+          <a:lstStyle/>
+          <a:p>
+            <a:fld id="{0056F46C-10DD-4BD5-82D5-2BDBF6A794D7}" type="slidenum">
+              <a:rPr lang="en-US"/>
+              <a:t>14</a:t>
             </a:fld>
             <a:endParaRPr lang="en-US"/>
           </a:p>
@@ -6327,7 +6503,7 @@
 </p:notes>
 </file>
 
-<file path=ppt/notesSlides/notesSlide14.xml><?xml version="1.0" encoding="utf-8"?>
+<file path=ppt/notesSlides/notesSlide16.xml><?xml version="1.0" encoding="utf-8"?>
 <p:notes xmlns:a="http://schemas.openxmlformats.org/drawingml/2006/main" xmlns:r="http://schemas.openxmlformats.org/officeDocument/2006/relationships" xmlns:p="http://schemas.openxmlformats.org/presentationml/2006/main">
   <p:cSld>
     <p:spTree>
@@ -6394,7 +6570,7 @@
           <a:p>
             <a:fld id="{0056F46C-10DD-4BD5-82D5-2BDBF6A794D7}" type="slidenum">
               <a:rPr lang="en-US"/>
-              <a:t>14</a:t>
+              <a:t>15</a:t>
             </a:fld>
             <a:endParaRPr lang="en-US"/>
           </a:p>
@@ -6654,7 +6830,7 @@
           <a:p>
             <a:fld id="{0056F46C-10DD-4BD5-82D5-2BDBF6A794D7}" type="slidenum">
               <a:rPr lang="en-US"/>
-              <a:t>7</a:t>
+              <a:t>11</a:t>
             </a:fld>
             <a:endParaRPr lang="en-US"/>
           </a:p>
@@ -6663,7 +6839,7 @@
     </p:spTree>
     <p:extLst>
       <p:ext uri="{BB962C8B-B14F-4D97-AF65-F5344CB8AC3E}">
-        <p14:creationId xmlns:p14="http://schemas.microsoft.com/office/powerpoint/2010/main" val="1667534270"/>
+        <p14:creationId xmlns:p14="http://schemas.microsoft.com/office/powerpoint/2010/main" val="3042386077"/>
       </p:ext>
     </p:extLst>
   </p:cSld>
@@ -6750,7 +6926,7 @@
     </p:spTree>
     <p:extLst>
       <p:ext uri="{BB962C8B-B14F-4D97-AF65-F5344CB8AC3E}">
-        <p14:creationId xmlns:p14="http://schemas.microsoft.com/office/powerpoint/2010/main" val="3978555677"/>
+        <p14:creationId xmlns:p14="http://schemas.microsoft.com/office/powerpoint/2010/main" val="448241849"/>
       </p:ext>
     </p:extLst>
   </p:cSld>
@@ -6837,7 +7013,7 @@
     </p:spTree>
     <p:extLst>
       <p:ext uri="{BB962C8B-B14F-4D97-AF65-F5344CB8AC3E}">
-        <p14:creationId xmlns:p14="http://schemas.microsoft.com/office/powerpoint/2010/main" val="1661393158"/>
+        <p14:creationId xmlns:p14="http://schemas.microsoft.com/office/powerpoint/2010/main" val="1667534270"/>
       </p:ext>
     </p:extLst>
   </p:cSld>
@@ -6924,7 +7100,7 @@
     </p:spTree>
     <p:extLst>
       <p:ext uri="{BB962C8B-B14F-4D97-AF65-F5344CB8AC3E}">
-        <p14:creationId xmlns:p14="http://schemas.microsoft.com/office/powerpoint/2010/main" val="1637494084"/>
+        <p14:creationId xmlns:p14="http://schemas.microsoft.com/office/powerpoint/2010/main" val="3978555677"/>
       </p:ext>
     </p:extLst>
   </p:cSld>
@@ -7002,7 +7178,7 @@
           <a:p>
             <a:fld id="{0056F46C-10DD-4BD5-82D5-2BDBF6A794D7}" type="slidenum">
               <a:rPr lang="en-US"/>
-              <a:t>9</a:t>
+              <a:t>7</a:t>
             </a:fld>
             <a:endParaRPr lang="en-US"/>
           </a:p>
@@ -7011,7 +7187,7 @@
     </p:spTree>
     <p:extLst>
       <p:ext uri="{BB962C8B-B14F-4D97-AF65-F5344CB8AC3E}">
-        <p14:creationId xmlns:p14="http://schemas.microsoft.com/office/powerpoint/2010/main" val="124190876"/>
+        <p14:creationId xmlns:p14="http://schemas.microsoft.com/office/powerpoint/2010/main" val="1661393158"/>
       </p:ext>
     </p:extLst>
   </p:cSld>
@@ -7089,7 +7265,7 @@
           <a:p>
             <a:fld id="{0056F46C-10DD-4BD5-82D5-2BDBF6A794D7}" type="slidenum">
               <a:rPr lang="en-US"/>
-              <a:t>10</a:t>
+              <a:t>9</a:t>
             </a:fld>
             <a:endParaRPr lang="en-US"/>
           </a:p>
@@ -7098,7 +7274,7 @@
     </p:spTree>
     <p:extLst>
       <p:ext uri="{BB962C8B-B14F-4D97-AF65-F5344CB8AC3E}">
-        <p14:creationId xmlns:p14="http://schemas.microsoft.com/office/powerpoint/2010/main" val="3021659947"/>
+        <p14:creationId xmlns:p14="http://schemas.microsoft.com/office/powerpoint/2010/main" val="124190876"/>
       </p:ext>
     </p:extLst>
   </p:cSld>
@@ -10772,6 +10948,1024 @@
       </p:grpSpPr>
       <p:sp>
         <p:nvSpPr>
+          <p:cNvPr id="48" name="Rectangle 47">
+            <a:extLst>
+              <a:ext uri="{FF2B5EF4-FFF2-40B4-BE49-F238E27FC236}">
+                <a16:creationId xmlns:a16="http://schemas.microsoft.com/office/drawing/2014/main" id="{6753252F-4873-4F63-801D-CC719279A7D5}"/>
+              </a:ext>
+              <a:ext uri="{C183D7F6-B498-43B3-948B-1728B52AA6E4}">
+                <adec:decorative xmlns:adec="http://schemas.microsoft.com/office/drawing/2017/decorative" val="1"/>
+              </a:ext>
+            </a:extLst>
+          </p:cNvPr>
+          <p:cNvSpPr>
+            <a:spLocks noGrp="1" noRot="1" noChangeAspect="1" noMove="1" noResize="1" noEditPoints="1" noAdjustHandles="1" noChangeArrowheads="1" noChangeShapeType="1" noTextEdit="1"/>
+          </p:cNvSpPr>
+          <p:nvPr>
+            <p:extLst>
+              <p:ext uri="{386F3935-93C4-4BCD-93E2-E3B085C9AB24}">
+                <p16:designElem xmlns:p16="http://schemas.microsoft.com/office/powerpoint/2015/main" val="1"/>
+              </p:ext>
+            </p:extLst>
+          </p:nvPr>
+        </p:nvSpPr>
+        <p:spPr>
+          <a:xfrm>
+            <a:off x="0" y="0"/>
+            <a:ext cx="12192000" cy="6858000"/>
+          </a:xfrm>
+          <a:prstGeom prst="rect">
+            <a:avLst/>
+          </a:prstGeom>
+          <a:solidFill>
+            <a:srgbClr val="FFFFFF"/>
+          </a:solidFill>
+          <a:ln>
+            <a:noFill/>
+          </a:ln>
+        </p:spPr>
+        <p:style>
+          <a:lnRef idx="2">
+            <a:schemeClr val="accent1">
+              <a:shade val="50000"/>
+            </a:schemeClr>
+          </a:lnRef>
+          <a:fillRef idx="1">
+            <a:schemeClr val="accent1"/>
+          </a:fillRef>
+          <a:effectRef idx="0">
+            <a:schemeClr val="accent1"/>
+          </a:effectRef>
+          <a:fontRef idx="minor">
+            <a:schemeClr val="lt1"/>
+          </a:fontRef>
+        </p:style>
+        <p:txBody>
+          <a:bodyPr rtlCol="0" anchor="ctr"/>
+          <a:lstStyle/>
+          <a:p>
+            <a:pPr algn="ctr"/>
+            <a:endParaRPr lang="en-US"/>
+          </a:p>
+        </p:txBody>
+      </p:sp>
+      <p:sp>
+        <p:nvSpPr>
+          <p:cNvPr id="50" name="Rectangle 49">
+            <a:extLst>
+              <a:ext uri="{FF2B5EF4-FFF2-40B4-BE49-F238E27FC236}">
+                <a16:creationId xmlns:a16="http://schemas.microsoft.com/office/drawing/2014/main" id="{047C8CCB-F95D-4249-92DD-651249D3535A}"/>
+              </a:ext>
+              <a:ext uri="{C183D7F6-B498-43B3-948B-1728B52AA6E4}">
+                <adec:decorative xmlns:adec="http://schemas.microsoft.com/office/drawing/2017/decorative" val="1"/>
+              </a:ext>
+            </a:extLst>
+          </p:cNvPr>
+          <p:cNvSpPr>
+            <a:spLocks noGrp="1" noRot="1" noChangeAspect="1" noMove="1" noResize="1" noEditPoints="1" noAdjustHandles="1" noChangeArrowheads="1" noChangeShapeType="1" noTextEdit="1"/>
+          </p:cNvSpPr>
+          <p:nvPr>
+            <p:extLst>
+              <p:ext uri="{386F3935-93C4-4BCD-93E2-E3B085C9AB24}">
+                <p16:designElem xmlns:p16="http://schemas.microsoft.com/office/powerpoint/2015/main" val="1"/>
+              </p:ext>
+            </p:extLst>
+          </p:nvPr>
+        </p:nvSpPr>
+        <p:spPr>
+          <a:xfrm>
+            <a:off x="0" y="0"/>
+            <a:ext cx="2013557" cy="6858000"/>
+          </a:xfrm>
+          <a:prstGeom prst="rect">
+            <a:avLst/>
+          </a:prstGeom>
+          <a:solidFill>
+            <a:srgbClr val="7F7F7F"/>
+          </a:solidFill>
+          <a:ln>
+            <a:noFill/>
+          </a:ln>
+        </p:spPr>
+        <p:style>
+          <a:lnRef idx="2">
+            <a:schemeClr val="accent1">
+              <a:shade val="50000"/>
+            </a:schemeClr>
+          </a:lnRef>
+          <a:fillRef idx="1">
+            <a:schemeClr val="accent1"/>
+          </a:fillRef>
+          <a:effectRef idx="0">
+            <a:schemeClr val="accent1"/>
+          </a:effectRef>
+          <a:fontRef idx="minor">
+            <a:schemeClr val="lt1"/>
+          </a:fontRef>
+        </p:style>
+        <p:txBody>
+          <a:bodyPr rtlCol="0" anchor="ctr"/>
+          <a:lstStyle/>
+          <a:p>
+            <a:pPr algn="ctr"/>
+            <a:endParaRPr lang="en-US"/>
+          </a:p>
+        </p:txBody>
+      </p:sp>
+      <p:sp>
+        <p:nvSpPr>
+          <p:cNvPr id="2" name="Title 1">
+            <a:extLst>
+              <a:ext uri="{FF2B5EF4-FFF2-40B4-BE49-F238E27FC236}">
+                <a16:creationId xmlns:a16="http://schemas.microsoft.com/office/drawing/2014/main" id="{29B58D0B-30E3-49BB-8913-49B1168A4CDC}"/>
+              </a:ext>
+            </a:extLst>
+          </p:cNvPr>
+          <p:cNvSpPr>
+            <a:spLocks noGrp="1"/>
+          </p:cNvSpPr>
+          <p:nvPr>
+            <p:ph type="title"/>
+          </p:nvPr>
+        </p:nvSpPr>
+        <p:spPr>
+          <a:xfrm>
+            <a:off x="640080" y="2074363"/>
+            <a:ext cx="2752354" cy="2709275"/>
+          </a:xfrm>
+          <a:prstGeom prst="ellipse">
+            <a:avLst/>
+          </a:prstGeom>
+          <a:solidFill>
+            <a:srgbClr val="262626"/>
+          </a:solidFill>
+          <a:ln w="174625" cmpd="thinThick">
+            <a:solidFill>
+              <a:srgbClr val="262626"/>
+            </a:solidFill>
+          </a:ln>
+        </p:spPr>
+        <p:txBody>
+          <a:bodyPr vert="horz" lIns="91440" tIns="45720" rIns="91440" bIns="45720" rtlCol="0" anchor="ctr">
+            <a:normAutofit/>
+          </a:bodyPr>
+          <a:lstStyle/>
+          <a:p>
+            <a:pPr algn="ctr"/>
+            <a:r>
+              <a:rPr lang="en-US" altLang="zh-CN" sz="2600" kern="1200" dirty="0">
+                <a:solidFill>
+                  <a:srgbClr val="FFFFFF"/>
+                </a:solidFill>
+                <a:latin typeface="+mj-lt"/>
+                <a:ea typeface="等线 Light"/>
+                <a:cs typeface="+mj-cs"/>
+              </a:rPr>
+              <a:t>Our design</a:t>
+            </a:r>
+            <a:br>
+              <a:rPr lang="en-US" altLang="zh-CN" sz="2600" dirty="0">
+                <a:solidFill>
+                  <a:srgbClr val="FFFFFF"/>
+                </a:solidFill>
+                <a:ea typeface="等线 Light"/>
+              </a:rPr>
+            </a:br>
+            <a:r>
+              <a:rPr lang="en-US" altLang="zh-CN" sz="2600" dirty="0">
+                <a:solidFill>
+                  <a:srgbClr val="FFFFFF"/>
+                </a:solidFill>
+                <a:ea typeface="等线 Light"/>
+                <a:cs typeface="Calibri Light"/>
+              </a:rPr>
+              <a:t>(Achieved so far)</a:t>
+            </a:r>
+            <a:endParaRPr lang="en-US" sz="2600" kern="1200" dirty="0">
+              <a:solidFill>
+                <a:srgbClr val="FFFFFF"/>
+              </a:solidFill>
+              <a:latin typeface="+mj-lt"/>
+              <a:ea typeface="+mj-ea"/>
+              <a:cs typeface="+mj-cs"/>
+            </a:endParaRPr>
+          </a:p>
+        </p:txBody>
+      </p:sp>
+      <p:sp>
+        <p:nvSpPr>
+          <p:cNvPr id="4" name="TextBox 3">
+            <a:extLst>
+              <a:ext uri="{FF2B5EF4-FFF2-40B4-BE49-F238E27FC236}">
+                <a16:creationId xmlns:a16="http://schemas.microsoft.com/office/drawing/2014/main" id="{2E7EBC9A-DD55-4E80-846B-2A51D7D58B2F}"/>
+              </a:ext>
+            </a:extLst>
+          </p:cNvPr>
+          <p:cNvSpPr txBox="1"/>
+          <p:nvPr/>
+        </p:nvSpPr>
+        <p:spPr>
+          <a:xfrm>
+            <a:off x="1524000" y="1525638"/>
+            <a:ext cx="9144000" cy="420001"/>
+          </a:xfrm>
+          <a:prstGeom prst="rect">
+            <a:avLst/>
+          </a:prstGeom>
+        </p:spPr>
+        <p:txBody>
+          <a:bodyPr rot="0" spcFirstLastPara="0" vertOverflow="overflow" horzOverflow="overflow" vert="horz" lIns="91440" tIns="45720" rIns="91440" bIns="45720" numCol="1" spcCol="0" rtlCol="0" fromWordArt="0" anchor="t" anchorCtr="0" forceAA="0" compatLnSpc="1">
+            <a:prstTxWarp prst="textNoShape">
+              <a:avLst/>
+            </a:prstTxWarp>
+            <a:normAutofit/>
+          </a:bodyPr>
+          <a:lstStyle/>
+          <a:p>
+            <a:pPr algn="ctr">
+              <a:lnSpc>
+                <a:spcPct val="90000"/>
+              </a:lnSpc>
+              <a:spcBef>
+                <a:spcPts val="1000"/>
+              </a:spcBef>
+            </a:pPr>
+            <a:endParaRPr lang="en-US" sz="2000" b="1" kern="1200">
+              <a:solidFill>
+                <a:srgbClr val="E7E6E6"/>
+              </a:solidFill>
+              <a:latin typeface="+mn-lt"/>
+              <a:cs typeface="Calibri"/>
+            </a:endParaRPr>
+          </a:p>
+        </p:txBody>
+      </p:sp>
+      <p:pic>
+        <p:nvPicPr>
+          <p:cNvPr id="3" name="Picture 5">
+            <a:extLst>
+              <a:ext uri="{FF2B5EF4-FFF2-40B4-BE49-F238E27FC236}">
+                <a16:creationId xmlns:a16="http://schemas.microsoft.com/office/drawing/2014/main" id="{8DCDE275-4C0F-400E-BB7C-D92E98BAAFEA}"/>
+              </a:ext>
+            </a:extLst>
+          </p:cNvPr>
+          <p:cNvPicPr>
+            <a:picLocks noChangeAspect="1"/>
+          </p:cNvPicPr>
+          <p:nvPr/>
+        </p:nvPicPr>
+        <p:blipFill>
+          <a:blip r:embed="rId3"/>
+          <a:stretch>
+            <a:fillRect/>
+          </a:stretch>
+        </p:blipFill>
+        <p:spPr>
+          <a:xfrm>
+            <a:off x="4724400" y="542027"/>
+            <a:ext cx="5474898" cy="5357002"/>
+          </a:xfrm>
+          <a:prstGeom prst="rect">
+            <a:avLst/>
+          </a:prstGeom>
+        </p:spPr>
+      </p:pic>
+    </p:spTree>
+    <p:extLst>
+      <p:ext uri="{BB962C8B-B14F-4D97-AF65-F5344CB8AC3E}">
+        <p14:creationId xmlns:p14="http://schemas.microsoft.com/office/powerpoint/2010/main" val="3734227668"/>
+      </p:ext>
+    </p:extLst>
+  </p:cSld>
+  <p:clrMapOvr>
+    <a:masterClrMapping/>
+  </p:clrMapOvr>
+  <p:timing>
+    <p:tnLst>
+      <p:par>
+        <p:cTn id="1" dur="indefinite" restart="never" nodeType="tmRoot">
+          <p:childTnLst>
+            <p:seq concurrent="1" nextAc="seek">
+              <p:cTn id="2" dur="indefinite" nodeType="mainSeq"/>
+              <p:prevCondLst>
+                <p:cond evt="onPrev" delay="0">
+                  <p:tgtEl>
+                    <p:sldTgt/>
+                  </p:tgtEl>
+                </p:cond>
+              </p:prevCondLst>
+              <p:nextCondLst>
+                <p:cond evt="onNext" delay="0">
+                  <p:tgtEl>
+                    <p:sldTgt/>
+                  </p:tgtEl>
+                </p:cond>
+              </p:nextCondLst>
+            </p:seq>
+          </p:childTnLst>
+        </p:cTn>
+      </p:par>
+    </p:tnLst>
+  </p:timing>
+</p:sld>
+</file>
+
+<file path=ppt/slides/slide11.xml><?xml version="1.0" encoding="utf-8"?>
+<p:sld xmlns:a="http://schemas.openxmlformats.org/drawingml/2006/main" xmlns:r="http://schemas.openxmlformats.org/officeDocument/2006/relationships" xmlns:p="http://schemas.openxmlformats.org/presentationml/2006/main">
+  <p:cSld>
+    <p:bg>
+      <p:bgPr>
+        <a:solidFill>
+          <a:schemeClr val="bg1"/>
+        </a:solidFill>
+        <a:effectLst/>
+      </p:bgPr>
+    </p:bg>
+    <p:spTree>
+      <p:nvGrpSpPr>
+        <p:cNvPr id="1" name=""/>
+        <p:cNvGrpSpPr/>
+        <p:nvPr/>
+      </p:nvGrpSpPr>
+      <p:grpSpPr>
+        <a:xfrm>
+          <a:off x="0" y="0"/>
+          <a:ext cx="0" cy="0"/>
+          <a:chOff x="0" y="0"/>
+          <a:chExt cx="0" cy="0"/>
+        </a:xfrm>
+      </p:grpSpPr>
+      <p:sp>
+        <p:nvSpPr>
+          <p:cNvPr id="41" name="Rectangle 40">
+            <a:extLst>
+              <a:ext uri="{FF2B5EF4-FFF2-40B4-BE49-F238E27FC236}">
+                <a16:creationId xmlns:a16="http://schemas.microsoft.com/office/drawing/2014/main" id="{823AC064-BC96-4F32-8AE1-B2FD38754823}"/>
+              </a:ext>
+              <a:ext uri="{C183D7F6-B498-43B3-948B-1728B52AA6E4}">
+                <adec:decorative xmlns:adec="http://schemas.microsoft.com/office/drawing/2017/decorative" val="1"/>
+              </a:ext>
+            </a:extLst>
+          </p:cNvPr>
+          <p:cNvSpPr>
+            <a:spLocks noGrp="1" noRot="1" noChangeAspect="1" noMove="1" noResize="1" noEditPoints="1" noAdjustHandles="1" noChangeArrowheads="1" noChangeShapeType="1" noTextEdit="1"/>
+          </p:cNvSpPr>
+          <p:nvPr>
+            <p:extLst>
+              <p:ext uri="{386F3935-93C4-4BCD-93E2-E3B085C9AB24}">
+                <p16:designElem xmlns:p16="http://schemas.microsoft.com/office/powerpoint/2015/main" val="1"/>
+              </p:ext>
+            </p:extLst>
+          </p:nvPr>
+        </p:nvSpPr>
+        <p:spPr bwMode="ltGray">
+          <a:xfrm>
+            <a:off x="378068" y="343486"/>
+            <a:ext cx="11438793" cy="1844256"/>
+          </a:xfrm>
+          <a:prstGeom prst="rect">
+            <a:avLst/>
+          </a:prstGeom>
+          <a:solidFill>
+            <a:srgbClr val="404040"/>
+          </a:solidFill>
+          <a:ln w="127000" cap="sq" cmpd="thinThick">
+            <a:solidFill>
+              <a:srgbClr val="404040"/>
+            </a:solidFill>
+          </a:ln>
+        </p:spPr>
+        <p:style>
+          <a:lnRef idx="2">
+            <a:schemeClr val="accent1">
+              <a:shade val="50000"/>
+            </a:schemeClr>
+          </a:lnRef>
+          <a:fillRef idx="1">
+            <a:schemeClr val="accent1"/>
+          </a:fillRef>
+          <a:effectRef idx="0">
+            <a:schemeClr val="accent1"/>
+          </a:effectRef>
+          <a:fontRef idx="minor">
+            <a:schemeClr val="lt1"/>
+          </a:fontRef>
+        </p:style>
+        <p:txBody>
+          <a:bodyPr rtlCol="0" anchor="ctr"/>
+          <a:lstStyle/>
+          <a:p>
+            <a:pPr marL="0" marR="0" lvl="0" indent="0" algn="ctr" defTabSz="914400" rtl="0" eaLnBrk="1" fontAlgn="auto" latinLnBrk="0" hangingPunct="1">
+              <a:lnSpc>
+                <a:spcPct val="100000"/>
+              </a:lnSpc>
+              <a:spcBef>
+                <a:spcPts val="0"/>
+              </a:spcBef>
+              <a:spcAft>
+                <a:spcPts val="0"/>
+              </a:spcAft>
+              <a:buClrTx/>
+              <a:buSzTx/>
+              <a:buFontTx/>
+              <a:buNone/>
+              <a:tabLst/>
+              <a:defRPr/>
+            </a:pPr>
+            <a:endParaRPr kumimoji="0" lang="en-US" sz="1800" b="0" i="0" u="none" strike="noStrike" kern="1200" cap="none" spc="0" normalizeH="0" baseline="0" noProof="0">
+              <a:ln>
+                <a:noFill/>
+              </a:ln>
+              <a:solidFill>
+                <a:prstClr val="white"/>
+              </a:solidFill>
+              <a:effectLst/>
+              <a:uLnTx/>
+              <a:uFillTx/>
+              <a:latin typeface="Calibri" panose="020F0502020204030204"/>
+              <a:ea typeface="+mn-ea"/>
+              <a:cs typeface="+mn-cs"/>
+            </a:endParaRPr>
+          </a:p>
+        </p:txBody>
+      </p:sp>
+      <p:sp>
+        <p:nvSpPr>
+          <p:cNvPr id="2" name="Title 1">
+            <a:extLst>
+              <a:ext uri="{FF2B5EF4-FFF2-40B4-BE49-F238E27FC236}">
+                <a16:creationId xmlns:a16="http://schemas.microsoft.com/office/drawing/2014/main" id="{29B58D0B-30E3-49BB-8913-49B1168A4CDC}"/>
+              </a:ext>
+            </a:extLst>
+          </p:cNvPr>
+          <p:cNvSpPr>
+            <a:spLocks noGrp="1"/>
+          </p:cNvSpPr>
+          <p:nvPr>
+            <p:ph type="title"/>
+          </p:nvPr>
+        </p:nvSpPr>
+        <p:spPr>
+          <a:xfrm>
+            <a:off x="526073" y="466578"/>
+            <a:ext cx="11139854" cy="930447"/>
+          </a:xfrm>
+        </p:spPr>
+        <p:txBody>
+          <a:bodyPr vert="horz" lIns="91440" tIns="45720" rIns="91440" bIns="45720" rtlCol="0" anchor="b">
+            <a:normAutofit/>
+          </a:bodyPr>
+          <a:lstStyle/>
+          <a:p>
+            <a:pPr algn="ctr"/>
+            <a:r>
+              <a:rPr lang="en-US" sz="5400" err="1">
+                <a:solidFill>
+                  <a:schemeClr val="bg1"/>
+                </a:solidFill>
+                <a:ea typeface="+mj-lt"/>
+                <a:cs typeface="+mj-lt"/>
+              </a:rPr>
+              <a:t>registerNWayMergeShuffle</a:t>
+            </a:r>
+            <a:endParaRPr lang="en-US" err="1">
+              <a:solidFill>
+                <a:schemeClr val="bg1"/>
+              </a:solidFill>
+              <a:cs typeface="Calibri Light"/>
+            </a:endParaRPr>
+          </a:p>
+        </p:txBody>
+      </p:sp>
+      <p:sp>
+        <p:nvSpPr>
+          <p:cNvPr id="4" name="TextBox 3">
+            <a:extLst>
+              <a:ext uri="{FF2B5EF4-FFF2-40B4-BE49-F238E27FC236}">
+                <a16:creationId xmlns:a16="http://schemas.microsoft.com/office/drawing/2014/main" id="{2E7EBC9A-DD55-4E80-846B-2A51D7D58B2F}"/>
+              </a:ext>
+            </a:extLst>
+          </p:cNvPr>
+          <p:cNvSpPr txBox="1"/>
+          <p:nvPr/>
+        </p:nvSpPr>
+        <p:spPr>
+          <a:xfrm>
+            <a:off x="1524000" y="1525638"/>
+            <a:ext cx="9144000" cy="420001"/>
+          </a:xfrm>
+          <a:prstGeom prst="rect">
+            <a:avLst/>
+          </a:prstGeom>
+        </p:spPr>
+        <p:txBody>
+          <a:bodyPr rot="0" spcFirstLastPara="0" vertOverflow="overflow" horzOverflow="overflow" vert="horz" lIns="91440" tIns="45720" rIns="91440" bIns="45720" numCol="1" spcCol="0" rtlCol="0" fromWordArt="0" anchor="t" anchorCtr="0" forceAA="0" compatLnSpc="1">
+            <a:prstTxWarp prst="textNoShape">
+              <a:avLst/>
+            </a:prstTxWarp>
+            <a:normAutofit/>
+          </a:bodyPr>
+          <a:lstStyle/>
+          <a:p>
+            <a:pPr algn="ctr">
+              <a:lnSpc>
+                <a:spcPct val="90000"/>
+              </a:lnSpc>
+              <a:spcBef>
+                <a:spcPts val="1000"/>
+              </a:spcBef>
+            </a:pPr>
+            <a:endParaRPr lang="en-US" sz="2000" b="1" kern="1200">
+              <a:solidFill>
+                <a:srgbClr val="E7E6E6"/>
+              </a:solidFill>
+              <a:latin typeface="+mn-lt"/>
+              <a:cs typeface="Calibri"/>
+            </a:endParaRPr>
+          </a:p>
+        </p:txBody>
+      </p:sp>
+      <p:cxnSp>
+        <p:nvCxnSpPr>
+          <p:cNvPr id="43" name="Straight Connector 42">
+            <a:extLst>
+              <a:ext uri="{FF2B5EF4-FFF2-40B4-BE49-F238E27FC236}">
+                <a16:creationId xmlns:a16="http://schemas.microsoft.com/office/drawing/2014/main" id="{7E7C77BC-7138-40B1-A15B-20F57A494629}"/>
+              </a:ext>
+              <a:ext uri="{C183D7F6-B498-43B3-948B-1728B52AA6E4}">
+                <adec:decorative xmlns:adec="http://schemas.microsoft.com/office/drawing/2017/decorative" val="1"/>
+              </a:ext>
+            </a:extLst>
+          </p:cNvPr>
+          <p:cNvCxnSpPr>
+            <a:cxnSpLocks noGrp="1" noRot="1" noChangeAspect="1" noMove="1" noResize="1" noEditPoints="1" noAdjustHandles="1" noChangeArrowheads="1" noChangeShapeType="1"/>
+          </p:cNvCxnSpPr>
+          <p:nvPr>
+            <p:extLst>
+              <p:ext uri="{386F3935-93C4-4BCD-93E2-E3B085C9AB24}">
+                <p16:designElem xmlns:p16="http://schemas.microsoft.com/office/powerpoint/2015/main" val="1"/>
+              </p:ext>
+            </p:extLst>
+          </p:nvPr>
+        </p:nvCxnSpPr>
+        <p:spPr>
+          <a:xfrm>
+            <a:off x="2209800" y="1448631"/>
+            <a:ext cx="7772400" cy="0"/>
+          </a:xfrm>
+          <a:prstGeom prst="line">
+            <a:avLst/>
+          </a:prstGeom>
+          <a:ln w="22225">
+            <a:solidFill>
+              <a:srgbClr val="D9D9D9"/>
+            </a:solidFill>
+          </a:ln>
+        </p:spPr>
+        <p:style>
+          <a:lnRef idx="1">
+            <a:schemeClr val="accent1"/>
+          </a:lnRef>
+          <a:fillRef idx="0">
+            <a:schemeClr val="accent1"/>
+          </a:fillRef>
+          <a:effectRef idx="0">
+            <a:schemeClr val="accent1"/>
+          </a:effectRef>
+          <a:fontRef idx="minor">
+            <a:schemeClr val="tx1"/>
+          </a:fontRef>
+        </p:style>
+      </p:cxnSp>
+      <p:pic>
+        <p:nvPicPr>
+          <p:cNvPr id="3" name="Picture 4" descr="A picture containing laptop, table, food, holding&#10;&#10;Description generated with very high confidence">
+            <a:extLst>
+              <a:ext uri="{FF2B5EF4-FFF2-40B4-BE49-F238E27FC236}">
+                <a16:creationId xmlns:a16="http://schemas.microsoft.com/office/drawing/2014/main" id="{B0585180-C170-436D-A8C8-13AE78DF68FF}"/>
+              </a:ext>
+            </a:extLst>
+          </p:cNvPr>
+          <p:cNvPicPr>
+            <a:picLocks noChangeAspect="1"/>
+          </p:cNvPicPr>
+          <p:nvPr/>
+        </p:nvPicPr>
+        <p:blipFill>
+          <a:blip r:embed="rId3"/>
+          <a:stretch>
+            <a:fillRect/>
+          </a:stretch>
+        </p:blipFill>
+        <p:spPr>
+          <a:xfrm>
+            <a:off x="1331344" y="3163482"/>
+            <a:ext cx="10061274" cy="2817037"/>
+          </a:xfrm>
+          <a:prstGeom prst="rect">
+            <a:avLst/>
+          </a:prstGeom>
+        </p:spPr>
+      </p:pic>
+    </p:spTree>
+    <p:extLst>
+      <p:ext uri="{BB962C8B-B14F-4D97-AF65-F5344CB8AC3E}">
+        <p14:creationId xmlns:p14="http://schemas.microsoft.com/office/powerpoint/2010/main" val="3445368243"/>
+      </p:ext>
+    </p:extLst>
+  </p:cSld>
+  <p:clrMapOvr>
+    <a:masterClrMapping/>
+  </p:clrMapOvr>
+  <p:timing>
+    <p:tnLst>
+      <p:par>
+        <p:cTn id="1" dur="indefinite" restart="never" nodeType="tmRoot">
+          <p:childTnLst>
+            <p:seq concurrent="1" nextAc="seek">
+              <p:cTn id="2" dur="indefinite" nodeType="mainSeq"/>
+              <p:prevCondLst>
+                <p:cond evt="onPrev" delay="0">
+                  <p:tgtEl>
+                    <p:sldTgt/>
+                  </p:tgtEl>
+                </p:cond>
+              </p:prevCondLst>
+              <p:nextCondLst>
+                <p:cond evt="onNext" delay="0">
+                  <p:tgtEl>
+                    <p:sldTgt/>
+                  </p:tgtEl>
+                </p:cond>
+              </p:nextCondLst>
+            </p:seq>
+          </p:childTnLst>
+        </p:cTn>
+      </p:par>
+    </p:tnLst>
+  </p:timing>
+</p:sld>
+</file>
+
+<file path=ppt/slides/slide12.xml><?xml version="1.0" encoding="utf-8"?>
+<p:sld xmlns:a="http://schemas.openxmlformats.org/drawingml/2006/main" xmlns:r="http://schemas.openxmlformats.org/officeDocument/2006/relationships" xmlns:p="http://schemas.openxmlformats.org/presentationml/2006/main">
+  <p:cSld>
+    <p:bg>
+      <p:bgPr>
+        <a:solidFill>
+          <a:schemeClr val="bg1"/>
+        </a:solidFill>
+        <a:effectLst/>
+      </p:bgPr>
+    </p:bg>
+    <p:spTree>
+      <p:nvGrpSpPr>
+        <p:cNvPr id="1" name=""/>
+        <p:cNvGrpSpPr/>
+        <p:nvPr/>
+      </p:nvGrpSpPr>
+      <p:grpSpPr>
+        <a:xfrm>
+          <a:off x="0" y="0"/>
+          <a:ext cx="0" cy="0"/>
+          <a:chOff x="0" y="0"/>
+          <a:chExt cx="0" cy="0"/>
+        </a:xfrm>
+      </p:grpSpPr>
+      <p:sp>
+        <p:nvSpPr>
+          <p:cNvPr id="48" name="Rectangle 47">
+            <a:extLst>
+              <a:ext uri="{FF2B5EF4-FFF2-40B4-BE49-F238E27FC236}">
+                <a16:creationId xmlns:a16="http://schemas.microsoft.com/office/drawing/2014/main" id="{823AC064-BC96-4F32-8AE1-B2FD38754823}"/>
+              </a:ext>
+              <a:ext uri="{C183D7F6-B498-43B3-948B-1728B52AA6E4}">
+                <adec:decorative xmlns:adec="http://schemas.microsoft.com/office/drawing/2017/decorative" val="1"/>
+              </a:ext>
+            </a:extLst>
+          </p:cNvPr>
+          <p:cNvSpPr>
+            <a:spLocks noGrp="1" noRot="1" noChangeAspect="1" noMove="1" noResize="1" noEditPoints="1" noAdjustHandles="1" noChangeArrowheads="1" noChangeShapeType="1" noTextEdit="1"/>
+          </p:cNvSpPr>
+          <p:nvPr>
+            <p:extLst>
+              <p:ext uri="{386F3935-93C4-4BCD-93E2-E3B085C9AB24}">
+                <p16:designElem xmlns:p16="http://schemas.microsoft.com/office/powerpoint/2015/main" val="1"/>
+              </p:ext>
+            </p:extLst>
+          </p:nvPr>
+        </p:nvSpPr>
+        <p:spPr bwMode="ltGray">
+          <a:xfrm>
+            <a:off x="378068" y="343486"/>
+            <a:ext cx="11438793" cy="1844256"/>
+          </a:xfrm>
+          <a:prstGeom prst="rect">
+            <a:avLst/>
+          </a:prstGeom>
+          <a:solidFill>
+            <a:srgbClr val="404040"/>
+          </a:solidFill>
+          <a:ln w="127000" cap="sq" cmpd="thinThick">
+            <a:solidFill>
+              <a:srgbClr val="404040"/>
+            </a:solidFill>
+          </a:ln>
+        </p:spPr>
+        <p:style>
+          <a:lnRef idx="2">
+            <a:schemeClr val="accent1">
+              <a:shade val="50000"/>
+            </a:schemeClr>
+          </a:lnRef>
+          <a:fillRef idx="1">
+            <a:schemeClr val="accent1"/>
+          </a:fillRef>
+          <a:effectRef idx="0">
+            <a:schemeClr val="accent1"/>
+          </a:effectRef>
+          <a:fontRef idx="minor">
+            <a:schemeClr val="lt1"/>
+          </a:fontRef>
+        </p:style>
+        <p:txBody>
+          <a:bodyPr rtlCol="0" anchor="ctr"/>
+          <a:lstStyle/>
+          <a:p>
+            <a:pPr marL="0" marR="0" lvl="0" indent="0" algn="ctr" defTabSz="914400" rtl="0" eaLnBrk="1" fontAlgn="auto" latinLnBrk="0" hangingPunct="1">
+              <a:lnSpc>
+                <a:spcPct val="100000"/>
+              </a:lnSpc>
+              <a:spcBef>
+                <a:spcPts val="0"/>
+              </a:spcBef>
+              <a:spcAft>
+                <a:spcPts val="0"/>
+              </a:spcAft>
+              <a:buClrTx/>
+              <a:buSzTx/>
+              <a:buFontTx/>
+              <a:buNone/>
+              <a:tabLst/>
+              <a:defRPr/>
+            </a:pPr>
+            <a:endParaRPr kumimoji="0" lang="en-US" sz="1800" b="0" i="0" u="none" strike="noStrike" kern="1200" cap="none" spc="0" normalizeH="0" baseline="0" noProof="0">
+              <a:ln>
+                <a:noFill/>
+              </a:ln>
+              <a:solidFill>
+                <a:prstClr val="white"/>
+              </a:solidFill>
+              <a:effectLst/>
+              <a:uLnTx/>
+              <a:uFillTx/>
+              <a:latin typeface="Calibri" panose="020F0502020204030204"/>
+              <a:ea typeface="+mn-ea"/>
+              <a:cs typeface="+mn-cs"/>
+            </a:endParaRPr>
+          </a:p>
+        </p:txBody>
+      </p:sp>
+      <p:sp>
+        <p:nvSpPr>
+          <p:cNvPr id="2" name="Title 1">
+            <a:extLst>
+              <a:ext uri="{FF2B5EF4-FFF2-40B4-BE49-F238E27FC236}">
+                <a16:creationId xmlns:a16="http://schemas.microsoft.com/office/drawing/2014/main" id="{29B58D0B-30E3-49BB-8913-49B1168A4CDC}"/>
+              </a:ext>
+            </a:extLst>
+          </p:cNvPr>
+          <p:cNvSpPr>
+            <a:spLocks noGrp="1"/>
+          </p:cNvSpPr>
+          <p:nvPr>
+            <p:ph type="title"/>
+          </p:nvPr>
+        </p:nvSpPr>
+        <p:spPr>
+          <a:xfrm>
+            <a:off x="526073" y="466578"/>
+            <a:ext cx="11139854" cy="930447"/>
+          </a:xfrm>
+        </p:spPr>
+        <p:txBody>
+          <a:bodyPr vert="horz" lIns="91440" tIns="45720" rIns="91440" bIns="45720" rtlCol="0" anchor="b">
+            <a:normAutofit/>
+          </a:bodyPr>
+          <a:lstStyle/>
+          <a:p>
+            <a:pPr algn="ctr"/>
+            <a:r>
+              <a:rPr lang="en-US" altLang="zh-CN" sz="5400" kern="1200">
+                <a:solidFill>
+                  <a:srgbClr val="FFFFFF"/>
+                </a:solidFill>
+                <a:latin typeface="+mj-lt"/>
+                <a:ea typeface="+mj-ea"/>
+                <a:cs typeface="+mj-cs"/>
+              </a:rPr>
+              <a:t>SortShuffleWriter</a:t>
+            </a:r>
+          </a:p>
+        </p:txBody>
+      </p:sp>
+      <p:cxnSp>
+        <p:nvCxnSpPr>
+          <p:cNvPr id="50" name="Straight Connector 49">
+            <a:extLst>
+              <a:ext uri="{FF2B5EF4-FFF2-40B4-BE49-F238E27FC236}">
+                <a16:creationId xmlns:a16="http://schemas.microsoft.com/office/drawing/2014/main" id="{7E7C77BC-7138-40B1-A15B-20F57A494629}"/>
+              </a:ext>
+              <a:ext uri="{C183D7F6-B498-43B3-948B-1728B52AA6E4}">
+                <adec:decorative xmlns:adec="http://schemas.microsoft.com/office/drawing/2017/decorative" val="1"/>
+              </a:ext>
+            </a:extLst>
+          </p:cNvPr>
+          <p:cNvCxnSpPr>
+            <a:cxnSpLocks noGrp="1" noRot="1" noChangeAspect="1" noMove="1" noResize="1" noEditPoints="1" noAdjustHandles="1" noChangeArrowheads="1" noChangeShapeType="1"/>
+          </p:cNvCxnSpPr>
+          <p:nvPr>
+            <p:extLst>
+              <p:ext uri="{386F3935-93C4-4BCD-93E2-E3B085C9AB24}">
+                <p16:designElem xmlns:p16="http://schemas.microsoft.com/office/powerpoint/2015/main" val="1"/>
+              </p:ext>
+            </p:extLst>
+          </p:nvPr>
+        </p:nvCxnSpPr>
+        <p:spPr>
+          <a:xfrm>
+            <a:off x="2209800" y="1448631"/>
+            <a:ext cx="7772400" cy="0"/>
+          </a:xfrm>
+          <a:prstGeom prst="line">
+            <a:avLst/>
+          </a:prstGeom>
+          <a:ln w="22225">
+            <a:solidFill>
+              <a:srgbClr val="D9D9D9"/>
+            </a:solidFill>
+          </a:ln>
+        </p:spPr>
+        <p:style>
+          <a:lnRef idx="1">
+            <a:schemeClr val="accent1"/>
+          </a:lnRef>
+          <a:fillRef idx="0">
+            <a:schemeClr val="accent1"/>
+          </a:fillRef>
+          <a:effectRef idx="0">
+            <a:schemeClr val="accent1"/>
+          </a:effectRef>
+          <a:fontRef idx="minor">
+            <a:schemeClr val="tx1"/>
+          </a:fontRef>
+        </p:style>
+      </p:cxnSp>
+      <p:pic>
+        <p:nvPicPr>
+          <p:cNvPr id="5" name="Picture 6" descr="A screenshot of a cell phone&#10;&#10;Description generated with very high confidence">
+            <a:extLst>
+              <a:ext uri="{FF2B5EF4-FFF2-40B4-BE49-F238E27FC236}">
+                <a16:creationId xmlns:a16="http://schemas.microsoft.com/office/drawing/2014/main" id="{83B02F05-ED2E-4093-9DDB-D8A93D921A5A}"/>
+              </a:ext>
+            </a:extLst>
+          </p:cNvPr>
+          <p:cNvPicPr>
+            <a:picLocks noChangeAspect="1"/>
+          </p:cNvPicPr>
+          <p:nvPr/>
+        </p:nvPicPr>
+        <p:blipFill>
+          <a:blip r:embed="rId3"/>
+          <a:stretch>
+            <a:fillRect/>
+          </a:stretch>
+        </p:blipFill>
+        <p:spPr>
+          <a:xfrm>
+            <a:off x="592235" y="2509911"/>
+            <a:ext cx="10952431" cy="3997637"/>
+          </a:xfrm>
+          <a:prstGeom prst="rect">
+            <a:avLst/>
+          </a:prstGeom>
+        </p:spPr>
+      </p:pic>
+      <p:sp>
+        <p:nvSpPr>
+          <p:cNvPr id="4" name="TextBox 3">
+            <a:extLst>
+              <a:ext uri="{FF2B5EF4-FFF2-40B4-BE49-F238E27FC236}">
+                <a16:creationId xmlns:a16="http://schemas.microsoft.com/office/drawing/2014/main" id="{2E7EBC9A-DD55-4E80-846B-2A51D7D58B2F}"/>
+              </a:ext>
+            </a:extLst>
+          </p:cNvPr>
+          <p:cNvSpPr txBox="1"/>
+          <p:nvPr/>
+        </p:nvSpPr>
+        <p:spPr>
+          <a:xfrm>
+            <a:off x="1524000" y="1525638"/>
+            <a:ext cx="9144000" cy="420001"/>
+          </a:xfrm>
+          <a:prstGeom prst="rect">
+            <a:avLst/>
+          </a:prstGeom>
+        </p:spPr>
+        <p:txBody>
+          <a:bodyPr rot="0" spcFirstLastPara="0" vertOverflow="overflow" horzOverflow="overflow" vert="horz" lIns="91440" tIns="45720" rIns="91440" bIns="45720" numCol="1" spcCol="0" rtlCol="0" fromWordArt="0" anchor="t" anchorCtr="0" forceAA="0" compatLnSpc="1">
+            <a:prstTxWarp prst="textNoShape">
+              <a:avLst/>
+            </a:prstTxWarp>
+            <a:normAutofit/>
+          </a:bodyPr>
+          <a:lstStyle/>
+          <a:p>
+            <a:pPr algn="ctr">
+              <a:lnSpc>
+                <a:spcPct val="90000"/>
+              </a:lnSpc>
+              <a:spcBef>
+                <a:spcPts val="1000"/>
+              </a:spcBef>
+            </a:pPr>
+            <a:endParaRPr lang="en-US" sz="2000" b="1" kern="1200">
+              <a:solidFill>
+                <a:srgbClr val="E7E6E6"/>
+              </a:solidFill>
+              <a:latin typeface="+mn-lt"/>
+              <a:cs typeface="Calibri"/>
+            </a:endParaRPr>
+          </a:p>
+        </p:txBody>
+      </p:sp>
+    </p:spTree>
+    <p:extLst>
+      <p:ext uri="{BB962C8B-B14F-4D97-AF65-F5344CB8AC3E}">
+        <p14:creationId xmlns:p14="http://schemas.microsoft.com/office/powerpoint/2010/main" val="3315153511"/>
+      </p:ext>
+    </p:extLst>
+  </p:cSld>
+  <p:clrMapOvr>
+    <a:masterClrMapping/>
+  </p:clrMapOvr>
+  <p:timing>
+    <p:tnLst>
+      <p:par>
+        <p:cTn id="1" dur="indefinite" restart="never" nodeType="tmRoot">
+          <p:childTnLst>
+            <p:seq concurrent="1" nextAc="seek">
+              <p:cTn id="2" dur="indefinite" nodeType="mainSeq"/>
+              <p:prevCondLst>
+                <p:cond evt="onPrev" delay="0">
+                  <p:tgtEl>
+                    <p:sldTgt/>
+                  </p:tgtEl>
+                </p:cond>
+              </p:prevCondLst>
+              <p:nextCondLst>
+                <p:cond evt="onNext" delay="0">
+                  <p:tgtEl>
+                    <p:sldTgt/>
+                  </p:tgtEl>
+                </p:cond>
+              </p:nextCondLst>
+            </p:seq>
+          </p:childTnLst>
+        </p:cTn>
+      </p:par>
+    </p:tnLst>
+  </p:timing>
+</p:sld>
+</file>
+
+<file path=ppt/slides/slide13.xml><?xml version="1.0" encoding="utf-8"?>
+<p:sld xmlns:a="http://schemas.openxmlformats.org/drawingml/2006/main" xmlns:r="http://schemas.openxmlformats.org/officeDocument/2006/relationships" xmlns:p="http://schemas.openxmlformats.org/presentationml/2006/main">
+  <p:cSld>
+    <p:bg>
+      <p:bgPr>
+        <a:solidFill>
+          <a:schemeClr val="bg1"/>
+        </a:solidFill>
+        <a:effectLst/>
+      </p:bgPr>
+    </p:bg>
+    <p:spTree>
+      <p:nvGrpSpPr>
+        <p:cNvPr id="1" name=""/>
+        <p:cNvGrpSpPr/>
+        <p:nvPr/>
+      </p:nvGrpSpPr>
+      <p:grpSpPr>
+        <a:xfrm>
+          <a:off x="0" y="0"/>
+          <a:ext cx="0" cy="0"/>
+          <a:chOff x="0" y="0"/>
+          <a:chExt cx="0" cy="0"/>
+        </a:xfrm>
+      </p:grpSpPr>
+      <p:sp>
+        <p:nvSpPr>
           <p:cNvPr id="41" name="Rectangle 40">
             <a:extLst>
               <a:ext uri="{FF2B5EF4-FFF2-40B4-BE49-F238E27FC236}">
@@ -11106,339 +12300,7 @@
 </p:sld>
 </file>
 
-<file path=ppt/slides/slide11.xml><?xml version="1.0" encoding="utf-8"?>
-<p:sld xmlns:a="http://schemas.openxmlformats.org/drawingml/2006/main" xmlns:r="http://schemas.openxmlformats.org/officeDocument/2006/relationships" xmlns:p="http://schemas.openxmlformats.org/presentationml/2006/main">
-  <p:cSld>
-    <p:bg>
-      <p:bgPr>
-        <a:solidFill>
-          <a:schemeClr val="bg1"/>
-        </a:solidFill>
-        <a:effectLst/>
-      </p:bgPr>
-    </p:bg>
-    <p:spTree>
-      <p:nvGrpSpPr>
-        <p:cNvPr id="1" name=""/>
-        <p:cNvGrpSpPr/>
-        <p:nvPr/>
-      </p:nvGrpSpPr>
-      <p:grpSpPr>
-        <a:xfrm>
-          <a:off x="0" y="0"/>
-          <a:ext cx="0" cy="0"/>
-          <a:chOff x="0" y="0"/>
-          <a:chExt cx="0" cy="0"/>
-        </a:xfrm>
-      </p:grpSpPr>
-      <p:sp>
-        <p:nvSpPr>
-          <p:cNvPr id="48" name="Rectangle 47">
-            <a:extLst>
-              <a:ext uri="{FF2B5EF4-FFF2-40B4-BE49-F238E27FC236}">
-                <a16:creationId xmlns:a16="http://schemas.microsoft.com/office/drawing/2014/main" id="{823AC064-BC96-4F32-8AE1-B2FD38754823}"/>
-              </a:ext>
-              <a:ext uri="{C183D7F6-B498-43B3-948B-1728B52AA6E4}">
-                <adec:decorative xmlns:adec="http://schemas.microsoft.com/office/drawing/2017/decorative" val="1"/>
-              </a:ext>
-            </a:extLst>
-          </p:cNvPr>
-          <p:cNvSpPr>
-            <a:spLocks noGrp="1" noRot="1" noChangeAspect="1" noMove="1" noResize="1" noEditPoints="1" noAdjustHandles="1" noChangeArrowheads="1" noChangeShapeType="1" noTextEdit="1"/>
-          </p:cNvSpPr>
-          <p:nvPr>
-            <p:extLst>
-              <p:ext uri="{386F3935-93C4-4BCD-93E2-E3B085C9AB24}">
-                <p16:designElem xmlns:p16="http://schemas.microsoft.com/office/powerpoint/2015/main" val="1"/>
-              </p:ext>
-            </p:extLst>
-          </p:nvPr>
-        </p:nvSpPr>
-        <p:spPr bwMode="ltGray">
-          <a:xfrm>
-            <a:off x="378068" y="343486"/>
-            <a:ext cx="11438793" cy="1844256"/>
-          </a:xfrm>
-          <a:prstGeom prst="rect">
-            <a:avLst/>
-          </a:prstGeom>
-          <a:solidFill>
-            <a:srgbClr val="404040"/>
-          </a:solidFill>
-          <a:ln w="127000" cap="sq" cmpd="thinThick">
-            <a:solidFill>
-              <a:srgbClr val="404040"/>
-            </a:solidFill>
-          </a:ln>
-        </p:spPr>
-        <p:style>
-          <a:lnRef idx="2">
-            <a:schemeClr val="accent1">
-              <a:shade val="50000"/>
-            </a:schemeClr>
-          </a:lnRef>
-          <a:fillRef idx="1">
-            <a:schemeClr val="accent1"/>
-          </a:fillRef>
-          <a:effectRef idx="0">
-            <a:schemeClr val="accent1"/>
-          </a:effectRef>
-          <a:fontRef idx="minor">
-            <a:schemeClr val="lt1"/>
-          </a:fontRef>
-        </p:style>
-        <p:txBody>
-          <a:bodyPr rtlCol="0" anchor="ctr"/>
-          <a:lstStyle/>
-          <a:p>
-            <a:pPr marL="0" marR="0" lvl="0" indent="0" algn="ctr" defTabSz="914400" rtl="0" eaLnBrk="1" fontAlgn="auto" latinLnBrk="0" hangingPunct="1">
-              <a:lnSpc>
-                <a:spcPct val="100000"/>
-              </a:lnSpc>
-              <a:spcBef>
-                <a:spcPts val="0"/>
-              </a:spcBef>
-              <a:spcAft>
-                <a:spcPts val="0"/>
-              </a:spcAft>
-              <a:buClrTx/>
-              <a:buSzTx/>
-              <a:buFontTx/>
-              <a:buNone/>
-              <a:tabLst/>
-              <a:defRPr/>
-            </a:pPr>
-            <a:endParaRPr kumimoji="0" lang="en-US" sz="1800" b="0" i="0" u="none" strike="noStrike" kern="1200" cap="none" spc="0" normalizeH="0" baseline="0" noProof="0">
-              <a:ln>
-                <a:noFill/>
-              </a:ln>
-              <a:solidFill>
-                <a:prstClr val="white"/>
-              </a:solidFill>
-              <a:effectLst/>
-              <a:uLnTx/>
-              <a:uFillTx/>
-              <a:latin typeface="Calibri" panose="020F0502020204030204"/>
-              <a:ea typeface="+mn-ea"/>
-              <a:cs typeface="+mn-cs"/>
-            </a:endParaRPr>
-          </a:p>
-        </p:txBody>
-      </p:sp>
-      <p:sp>
-        <p:nvSpPr>
-          <p:cNvPr id="2" name="Title 1">
-            <a:extLst>
-              <a:ext uri="{FF2B5EF4-FFF2-40B4-BE49-F238E27FC236}">
-                <a16:creationId xmlns:a16="http://schemas.microsoft.com/office/drawing/2014/main" id="{29B58D0B-30E3-49BB-8913-49B1168A4CDC}"/>
-              </a:ext>
-            </a:extLst>
-          </p:cNvPr>
-          <p:cNvSpPr>
-            <a:spLocks noGrp="1"/>
-          </p:cNvSpPr>
-          <p:nvPr>
-            <p:ph type="title"/>
-          </p:nvPr>
-        </p:nvSpPr>
-        <p:spPr>
-          <a:xfrm>
-            <a:off x="526073" y="466578"/>
-            <a:ext cx="11139854" cy="930447"/>
-          </a:xfrm>
-        </p:spPr>
-        <p:txBody>
-          <a:bodyPr vert="horz" lIns="91440" tIns="45720" rIns="91440" bIns="45720" rtlCol="0" anchor="b">
-            <a:normAutofit/>
-          </a:bodyPr>
-          <a:lstStyle/>
-          <a:p>
-            <a:pPr algn="ctr"/>
-            <a:r>
-              <a:rPr lang="en-US" altLang="zh-CN" sz="5400" kern="1200">
-                <a:solidFill>
-                  <a:srgbClr val="FFFFFF"/>
-                </a:solidFill>
-                <a:latin typeface="+mj-lt"/>
-                <a:ea typeface="+mj-ea"/>
-                <a:cs typeface="+mj-cs"/>
-              </a:rPr>
-              <a:t>SortShuffleWriter</a:t>
-            </a:r>
-          </a:p>
-        </p:txBody>
-      </p:sp>
-      <p:cxnSp>
-        <p:nvCxnSpPr>
-          <p:cNvPr id="50" name="Straight Connector 49">
-            <a:extLst>
-              <a:ext uri="{FF2B5EF4-FFF2-40B4-BE49-F238E27FC236}">
-                <a16:creationId xmlns:a16="http://schemas.microsoft.com/office/drawing/2014/main" id="{7E7C77BC-7138-40B1-A15B-20F57A494629}"/>
-              </a:ext>
-              <a:ext uri="{C183D7F6-B498-43B3-948B-1728B52AA6E4}">
-                <adec:decorative xmlns:adec="http://schemas.microsoft.com/office/drawing/2017/decorative" val="1"/>
-              </a:ext>
-            </a:extLst>
-          </p:cNvPr>
-          <p:cNvCxnSpPr>
-            <a:cxnSpLocks noGrp="1" noRot="1" noChangeAspect="1" noMove="1" noResize="1" noEditPoints="1" noAdjustHandles="1" noChangeArrowheads="1" noChangeShapeType="1"/>
-          </p:cNvCxnSpPr>
-          <p:nvPr>
-            <p:extLst>
-              <p:ext uri="{386F3935-93C4-4BCD-93E2-E3B085C9AB24}">
-                <p16:designElem xmlns:p16="http://schemas.microsoft.com/office/powerpoint/2015/main" val="1"/>
-              </p:ext>
-            </p:extLst>
-          </p:nvPr>
-        </p:nvCxnSpPr>
-        <p:spPr>
-          <a:xfrm>
-            <a:off x="2209800" y="1448631"/>
-            <a:ext cx="7772400" cy="0"/>
-          </a:xfrm>
-          <a:prstGeom prst="line">
-            <a:avLst/>
-          </a:prstGeom>
-          <a:ln w="22225">
-            <a:solidFill>
-              <a:srgbClr val="D9D9D9"/>
-            </a:solidFill>
-          </a:ln>
-        </p:spPr>
-        <p:style>
-          <a:lnRef idx="1">
-            <a:schemeClr val="accent1"/>
-          </a:lnRef>
-          <a:fillRef idx="0">
-            <a:schemeClr val="accent1"/>
-          </a:fillRef>
-          <a:effectRef idx="0">
-            <a:schemeClr val="accent1"/>
-          </a:effectRef>
-          <a:fontRef idx="minor">
-            <a:schemeClr val="tx1"/>
-          </a:fontRef>
-        </p:style>
-      </p:cxnSp>
-      <p:pic>
-        <p:nvPicPr>
-          <p:cNvPr id="5" name="Picture 6" descr="A screenshot of a cell phone&#10;&#10;Description generated with very high confidence">
-            <a:extLst>
-              <a:ext uri="{FF2B5EF4-FFF2-40B4-BE49-F238E27FC236}">
-                <a16:creationId xmlns:a16="http://schemas.microsoft.com/office/drawing/2014/main" id="{83B02F05-ED2E-4093-9DDB-D8A93D921A5A}"/>
-              </a:ext>
-            </a:extLst>
-          </p:cNvPr>
-          <p:cNvPicPr>
-            <a:picLocks noChangeAspect="1"/>
-          </p:cNvPicPr>
-          <p:nvPr/>
-        </p:nvPicPr>
-        <p:blipFill>
-          <a:blip r:embed="rId3"/>
-          <a:stretch>
-            <a:fillRect/>
-          </a:stretch>
-        </p:blipFill>
-        <p:spPr>
-          <a:xfrm>
-            <a:off x="592235" y="2509911"/>
-            <a:ext cx="10952431" cy="3997637"/>
-          </a:xfrm>
-          <a:prstGeom prst="rect">
-            <a:avLst/>
-          </a:prstGeom>
-        </p:spPr>
-      </p:pic>
-      <p:sp>
-        <p:nvSpPr>
-          <p:cNvPr id="4" name="TextBox 3">
-            <a:extLst>
-              <a:ext uri="{FF2B5EF4-FFF2-40B4-BE49-F238E27FC236}">
-                <a16:creationId xmlns:a16="http://schemas.microsoft.com/office/drawing/2014/main" id="{2E7EBC9A-DD55-4E80-846B-2A51D7D58B2F}"/>
-              </a:ext>
-            </a:extLst>
-          </p:cNvPr>
-          <p:cNvSpPr txBox="1"/>
-          <p:nvPr/>
-        </p:nvSpPr>
-        <p:spPr>
-          <a:xfrm>
-            <a:off x="1524000" y="1525638"/>
-            <a:ext cx="9144000" cy="420001"/>
-          </a:xfrm>
-          <a:prstGeom prst="rect">
-            <a:avLst/>
-          </a:prstGeom>
-        </p:spPr>
-        <p:txBody>
-          <a:bodyPr rot="0" spcFirstLastPara="0" vertOverflow="overflow" horzOverflow="overflow" vert="horz" lIns="91440" tIns="45720" rIns="91440" bIns="45720" numCol="1" spcCol="0" rtlCol="0" fromWordArt="0" anchor="t" anchorCtr="0" forceAA="0" compatLnSpc="1">
-            <a:prstTxWarp prst="textNoShape">
-              <a:avLst/>
-            </a:prstTxWarp>
-            <a:normAutofit/>
-          </a:bodyPr>
-          <a:lstStyle/>
-          <a:p>
-            <a:pPr algn="ctr">
-              <a:lnSpc>
-                <a:spcPct val="90000"/>
-              </a:lnSpc>
-              <a:spcBef>
-                <a:spcPts val="1000"/>
-              </a:spcBef>
-            </a:pPr>
-            <a:endParaRPr lang="en-US" sz="2000" b="1" kern="1200">
-              <a:solidFill>
-                <a:srgbClr val="E7E6E6"/>
-              </a:solidFill>
-              <a:latin typeface="+mn-lt"/>
-              <a:cs typeface="Calibri"/>
-            </a:endParaRPr>
-          </a:p>
-        </p:txBody>
-      </p:sp>
-    </p:spTree>
-    <p:extLst>
-      <p:ext uri="{BB962C8B-B14F-4D97-AF65-F5344CB8AC3E}">
-        <p14:creationId xmlns:p14="http://schemas.microsoft.com/office/powerpoint/2010/main" val="3315153511"/>
-      </p:ext>
-    </p:extLst>
-  </p:cSld>
-  <p:clrMapOvr>
-    <a:masterClrMapping/>
-  </p:clrMapOvr>
-  <p:timing>
-    <p:tnLst>
-      <p:par>
-        <p:cTn id="1" dur="indefinite" restart="never" nodeType="tmRoot">
-          <p:childTnLst>
-            <p:seq concurrent="1" nextAc="seek">
-              <p:cTn id="2" dur="indefinite" nodeType="mainSeq"/>
-              <p:prevCondLst>
-                <p:cond evt="onPrev" delay="0">
-                  <p:tgtEl>
-                    <p:sldTgt/>
-                  </p:tgtEl>
-                </p:cond>
-              </p:prevCondLst>
-              <p:nextCondLst>
-                <p:cond evt="onNext" delay="0">
-                  <p:tgtEl>
-                    <p:sldTgt/>
-                  </p:tgtEl>
-                </p:cond>
-              </p:nextCondLst>
-            </p:seq>
-          </p:childTnLst>
-        </p:cTn>
-      </p:par>
-    </p:tnLst>
-  </p:timing>
-</p:sld>
-</file>
-
-<file path=ppt/slides/slide12.xml><?xml version="1.0" encoding="utf-8"?>
+<file path=ppt/slides/slide14.xml><?xml version="1.0" encoding="utf-8"?>
 <p:sld xmlns:a="http://schemas.openxmlformats.org/drawingml/2006/main" xmlns:r="http://schemas.openxmlformats.org/officeDocument/2006/relationships" xmlns:p="http://schemas.openxmlformats.org/presentationml/2006/main">
   <p:cSld>
     <p:bg>
@@ -11769,7 +12631,7 @@
 </p:sld>
 </file>
 
-<file path=ppt/slides/slide13.xml><?xml version="1.0" encoding="utf-8"?>
+<file path=ppt/slides/slide15.xml><?xml version="1.0" encoding="utf-8"?>
 <p:sld xmlns:a="http://schemas.openxmlformats.org/drawingml/2006/main" xmlns:r="http://schemas.openxmlformats.org/officeDocument/2006/relationships" xmlns:p="http://schemas.openxmlformats.org/presentationml/2006/main">
   <p:cSld>
     <p:bg>
@@ -12430,7 +13292,7 @@
 </p:sld>
 </file>
 
-<file path=ppt/slides/slide14.xml><?xml version="1.0" encoding="utf-8"?>
+<file path=ppt/slides/slide16.xml><?xml version="1.0" encoding="utf-8"?>
 <p:sld xmlns:a="http://schemas.openxmlformats.org/drawingml/2006/main" xmlns:r="http://schemas.openxmlformats.org/officeDocument/2006/relationships" xmlns:p="http://schemas.openxmlformats.org/presentationml/2006/main">
   <p:cSld>
     <p:bg>
@@ -12731,12 +13593,12 @@
             </a:endParaRPr>
           </a:p>
           <a:p>
-            <a:endParaRPr lang="en-US">
+            <a:endParaRPr lang="en-US" dirty="0">
               <a:cs typeface="Calibri"/>
             </a:endParaRPr>
           </a:p>
           <a:p>
-            <a:endParaRPr lang="en-US">
+            <a:endParaRPr lang="en-US" dirty="0">
               <a:cs typeface="Calibri"/>
             </a:endParaRPr>
           </a:p>
@@ -12771,6 +13633,9 @@
               </a:rPr>
               <a:t>3. Merge should be terminated almost immediately after all Mappers finish.</a:t>
             </a:r>
+            <a:endParaRPr lang="en-US" sz="2400" dirty="0">
+              <a:cs typeface="Calibri"/>
+            </a:endParaRPr>
           </a:p>
         </p:txBody>
       </p:sp>
@@ -12814,7 +13679,7 @@
 </p:sld>
 </file>
 
-<file path=ppt/slides/slide15.xml><?xml version="1.0" encoding="utf-8"?>
+<file path=ppt/slides/slide17.xml><?xml version="1.0" encoding="utf-8"?>
 <p:sld xmlns:a="http://schemas.openxmlformats.org/drawingml/2006/main" xmlns:r="http://schemas.openxmlformats.org/officeDocument/2006/relationships" xmlns:p="http://schemas.openxmlformats.org/presentationml/2006/main">
   <p:cSld>
     <p:bg>
@@ -13138,36 +14003,54 @@
           <a:lstStyle/>
           <a:p>
             <a:r>
-              <a:rPr lang="en-US">
+              <a:rPr lang="en-US" dirty="0">
                 <a:cs typeface="Calibri"/>
               </a:rPr>
-              <a:t>1. Map task and merge task start at the same time</a:t>
+              <a:t>1. Map task and merge task </a:t>
             </a:r>
-          </a:p>
-          <a:p>
-            <a:endParaRPr lang="en-US">
-              <a:cs typeface="Calibri"/>
-            </a:endParaRPr>
-          </a:p>
-          <a:p>
             <a:r>
               <a:rPr lang="en-US">
                 <a:cs typeface="Calibri"/>
               </a:rPr>
-              <a:t>2. Merge Task tracks the mapout put, whenever it meet the certain condition (e.g. N blocks), it starts to merge blocks together</a:t>
+              <a:t>start at the same time</a:t>
             </a:r>
           </a:p>
           <a:p>
-            <a:endParaRPr lang="en-US">
+            <a:endParaRPr lang="en-US" dirty="0">
               <a:cs typeface="Calibri"/>
             </a:endParaRPr>
           </a:p>
           <a:p>
+            <a:r>
+              <a:rPr lang="en-US" dirty="0">
+                <a:cs typeface="Calibri"/>
+              </a:rPr>
+              <a:t>2. Merge Task tracks the mapout put, whenever it meet the certain condition (e.g. N blocks), it starts to </a:t>
+            </a:r>
             <a:r>
               <a:rPr lang="en-US">
                 <a:cs typeface="Calibri"/>
               </a:rPr>
-              <a:t>3. Metadata of  both merged files and origin files will be send to reducers and reducers will figure out if merged files are available</a:t>
+              <a:t>merge blocks together</a:t>
+            </a:r>
+          </a:p>
+          <a:p>
+            <a:endParaRPr lang="en-US" dirty="0">
+              <a:cs typeface="Calibri"/>
+            </a:endParaRPr>
+          </a:p>
+          <a:p>
+            <a:r>
+              <a:rPr lang="en-US" dirty="0">
+                <a:cs typeface="Calibri"/>
+              </a:rPr>
+              <a:t>3. Metadata of  both </a:t>
+            </a:r>
+            <a:r>
+              <a:rPr lang="en-US">
+                <a:cs typeface="Calibri"/>
+              </a:rPr>
+              <a:t>merged files and origin files will be send to reducers and reducers will figure out if merged files are available</a:t>
             </a:r>
           </a:p>
         </p:txBody>
@@ -13212,7 +14095,7 @@
 </p:sld>
 </file>
 
-<file path=ppt/slides/slide16.xml><?xml version="1.0" encoding="utf-8"?>
+<file path=ppt/slides/slide18.xml><?xml version="1.0" encoding="utf-8"?>
 <p:sld xmlns:a="http://schemas.openxmlformats.org/drawingml/2006/main" xmlns:r="http://schemas.openxmlformats.org/officeDocument/2006/relationships" xmlns:p="http://schemas.openxmlformats.org/presentationml/2006/main">
   <p:cSld>
     <p:bg>
@@ -13519,7 +14402,7 @@
           </a:p>
           <a:p>
             <a:r>
-              <a:rPr lang="en-US">
+              <a:rPr lang="en-US" dirty="0">
                 <a:ea typeface="+mn-lt"/>
                 <a:cs typeface="+mn-lt"/>
               </a:rPr>
@@ -13545,7 +14428,7 @@
           </a:p>
           <a:p>
             <a:r>
-              <a:rPr lang="en-US">
+              <a:rPr lang="en-US" dirty="0">
                 <a:ea typeface="+mn-lt"/>
                 <a:cs typeface="+mn-lt"/>
               </a:rPr>
@@ -13566,12 +14449,12 @@
               <a:t> mergeContinuousShuffleBlockIdsIfNeeded(curBlocks)</a:t>
             </a:r>
             <a:br>
-              <a:rPr lang="en-US">
+              <a:rPr lang="en-US" dirty="0">
                 <a:ea typeface="+mn-lt"/>
                 <a:cs typeface="+mn-lt"/>
               </a:rPr>
             </a:br>
-            <a:endParaRPr lang="en-US">
+            <a:endParaRPr lang="en-US" dirty="0">
               <a:ea typeface="+mn-lt"/>
               <a:cs typeface="+mn-lt"/>
             </a:endParaRPr>
@@ -13584,9 +14467,13 @@
               </a:rPr>
               <a:t>    Number of fetch request depends on the number of discontinuous blocks</a:t>
             </a:r>
-          </a:p>
-          <a:p>
-            <a:endParaRPr lang="en-US">
+            <a:endParaRPr lang="en-US" dirty="0">
+              <a:ea typeface="+mn-lt"/>
+              <a:cs typeface="+mn-lt"/>
+            </a:endParaRPr>
+          </a:p>
+          <a:p>
+            <a:endParaRPr lang="en-US" dirty="0">
               <a:ea typeface="+mn-lt"/>
               <a:cs typeface="+mn-lt"/>
             </a:endParaRPr>
@@ -13614,7 +14501,7 @@
             </a:r>
           </a:p>
           <a:p>
-            <a:endParaRPr lang="en-US">
+            <a:endParaRPr lang="en-US" dirty="0">
               <a:ea typeface="+mn-lt"/>
               <a:cs typeface="+mn-lt"/>
             </a:endParaRPr>
@@ -13655,14 +14542,14 @@
           </a:p>
           <a:p>
             <a:r>
-              <a:rPr lang="en-US">
+              <a:rPr lang="en-US" dirty="0">
                 <a:ea typeface="+mn-lt"/>
                 <a:cs typeface="+mn-lt"/>
               </a:rPr>
               <a:t>    </a:t>
             </a:r>
             <a:r>
-              <a:rPr lang="en-US" b="1">
+              <a:rPr lang="en-US" b="1" dirty="0">
                 <a:ea typeface="+mn-lt"/>
                 <a:cs typeface="+mn-lt"/>
               </a:rPr>
@@ -13675,33 +14562,37 @@
               </a:rPr>
               <a:t>Size check</a:t>
             </a:r>
-          </a:p>
-          <a:p>
-            <a:endParaRPr lang="en-US">
+            <a:endParaRPr lang="en-US" dirty="0">
               <a:ea typeface="+mn-lt"/>
               <a:cs typeface="+mn-lt"/>
             </a:endParaRPr>
           </a:p>
           <a:p>
-            <a:endParaRPr lang="en-US">
+            <a:endParaRPr lang="en-US" dirty="0">
               <a:ea typeface="+mn-lt"/>
               <a:cs typeface="+mn-lt"/>
             </a:endParaRPr>
           </a:p>
           <a:p>
+            <a:endParaRPr lang="en-US" dirty="0">
+              <a:ea typeface="+mn-lt"/>
+              <a:cs typeface="+mn-lt"/>
+            </a:endParaRPr>
+          </a:p>
+          <a:p>
             <a:br>
-              <a:rPr lang="en-US">
+              <a:rPr lang="en-US" dirty="0">
                 <a:ea typeface="+mn-lt"/>
                 <a:cs typeface="+mn-lt"/>
               </a:rPr>
             </a:br>
             <a:br>
-              <a:rPr lang="en-US">
+              <a:rPr lang="en-US" dirty="0">
                 <a:ea typeface="+mn-lt"/>
                 <a:cs typeface="+mn-lt"/>
               </a:rPr>
             </a:br>
-            <a:endParaRPr lang="en-US">
+            <a:endParaRPr lang="en-US" dirty="0">
               <a:ea typeface="+mn-lt"/>
               <a:cs typeface="+mn-lt"/>
             </a:endParaRPr>
@@ -13748,7 +14639,7 @@
 </p:sld>
 </file>
 
-<file path=ppt/slides/slide17.xml><?xml version="1.0" encoding="utf-8"?>
+<file path=ppt/slides/slide19.xml><?xml version="1.0" encoding="utf-8"?>
 <p:sld xmlns:a="http://schemas.openxmlformats.org/drawingml/2006/main" xmlns:r="http://schemas.openxmlformats.org/officeDocument/2006/relationships" xmlns:p="http://schemas.openxmlformats.org/presentationml/2006/main">
   <p:cSld>
     <p:bg>
@@ -14516,7 +15407,7 @@
             </a:r>
           </a:p>
           <a:p>
-            <a:endParaRPr lang="en-US" sz="1800" dirty="0">
+            <a:endParaRPr lang="en-US" sz="1800">
               <a:solidFill>
                 <a:schemeClr val="bg1"/>
               </a:solidFill>
@@ -14529,283 +15420,6 @@
     <p:extLst>
       <p:ext uri="{BB962C8B-B14F-4D97-AF65-F5344CB8AC3E}">
         <p14:creationId xmlns:p14="http://schemas.microsoft.com/office/powerpoint/2010/main" val="1079886339"/>
-      </p:ext>
-    </p:extLst>
-  </p:cSld>
-  <p:clrMapOvr>
-    <a:masterClrMapping/>
-  </p:clrMapOvr>
-</p:sld>
-</file>
-
-<file path=ppt/slides/slide18.xml><?xml version="1.0" encoding="utf-8"?>
-<p:sld xmlns:a="http://schemas.openxmlformats.org/drawingml/2006/main" xmlns:r="http://schemas.openxmlformats.org/officeDocument/2006/relationships" xmlns:p="http://schemas.openxmlformats.org/presentationml/2006/main">
-  <p:cSld>
-    <p:bg>
-      <p:bgPr>
-        <a:solidFill>
-          <a:schemeClr val="bg1"/>
-        </a:solidFill>
-        <a:effectLst/>
-      </p:bgPr>
-    </p:bg>
-    <p:spTree>
-      <p:nvGrpSpPr>
-        <p:cNvPr id="1" name=""/>
-        <p:cNvGrpSpPr/>
-        <p:nvPr/>
-      </p:nvGrpSpPr>
-      <p:grpSpPr>
-        <a:xfrm>
-          <a:off x="0" y="0"/>
-          <a:ext cx="0" cy="0"/>
-          <a:chOff x="0" y="0"/>
-          <a:chExt cx="0" cy="0"/>
-        </a:xfrm>
-      </p:grpSpPr>
-      <p:sp>
-        <p:nvSpPr>
-          <p:cNvPr id="5" name="Rectangle 7">
-            <a:extLst>
-              <a:ext uri="{FF2B5EF4-FFF2-40B4-BE49-F238E27FC236}">
-                <a16:creationId xmlns:a16="http://schemas.microsoft.com/office/drawing/2014/main" id="{3EDD119B-6BFA-4C3F-90CE-97DAFD604ECC}"/>
-              </a:ext>
-              <a:ext uri="{C183D7F6-B498-43B3-948B-1728B52AA6E4}">
-                <adec:decorative xmlns:adec="http://schemas.microsoft.com/office/drawing/2017/decorative" val="1"/>
-              </a:ext>
-            </a:extLst>
-          </p:cNvPr>
-          <p:cNvSpPr>
-            <a:spLocks noGrp="1" noRot="1" noChangeAspect="1" noMove="1" noResize="1" noEditPoints="1" noAdjustHandles="1" noChangeArrowheads="1" noChangeShapeType="1" noTextEdit="1"/>
-          </p:cNvSpPr>
-          <p:nvPr>
-            <p:extLst>
-              <p:ext uri="{386F3935-93C4-4BCD-93E2-E3B085C9AB24}">
-                <p16:designElem xmlns:p16="http://schemas.microsoft.com/office/powerpoint/2015/main" val="1"/>
-              </p:ext>
-            </p:extLst>
-          </p:nvPr>
-        </p:nvSpPr>
-        <p:spPr bwMode="ltGray">
-          <a:xfrm>
-            <a:off x="321564" y="320040"/>
-            <a:ext cx="11548872" cy="6217920"/>
-          </a:xfrm>
-          <a:prstGeom prst="rect">
-            <a:avLst/>
-          </a:prstGeom>
-          <a:solidFill>
-            <a:schemeClr val="tx1">
-              <a:lumMod val="75000"/>
-              <a:lumOff val="25000"/>
-            </a:schemeClr>
-          </a:solidFill>
-          <a:ln w="127000" cap="sq" cmpd="thinThick">
-            <a:noFill/>
-          </a:ln>
-        </p:spPr>
-        <p:style>
-          <a:lnRef idx="2">
-            <a:schemeClr val="accent1">
-              <a:shade val="50000"/>
-            </a:schemeClr>
-          </a:lnRef>
-          <a:fillRef idx="1">
-            <a:schemeClr val="accent1"/>
-          </a:fillRef>
-          <a:effectRef idx="0">
-            <a:schemeClr val="accent1"/>
-          </a:effectRef>
-          <a:fontRef idx="minor">
-            <a:schemeClr val="lt1"/>
-          </a:fontRef>
-        </p:style>
-        <p:txBody>
-          <a:bodyPr rtlCol="0" anchor="ctr"/>
-          <a:lstStyle/>
-          <a:p>
-            <a:pPr algn="ctr"/>
-            <a:endParaRPr lang="en-US"/>
-          </a:p>
-        </p:txBody>
-      </p:sp>
-      <p:sp>
-        <p:nvSpPr>
-          <p:cNvPr id="2" name="Title 1">
-            <a:extLst>
-              <a:ext uri="{FF2B5EF4-FFF2-40B4-BE49-F238E27FC236}">
-                <a16:creationId xmlns:a16="http://schemas.microsoft.com/office/drawing/2014/main" id="{8452AC9B-6AA6-4029-8B16-DECBEC9A4852}"/>
-              </a:ext>
-            </a:extLst>
-          </p:cNvPr>
-          <p:cNvSpPr>
-            <a:spLocks noGrp="1"/>
-          </p:cNvSpPr>
-          <p:nvPr>
-            <p:ph type="ctrTitle"/>
-          </p:nvPr>
-        </p:nvSpPr>
-        <p:spPr>
-          <a:xfrm>
-            <a:off x="4380588" y="965199"/>
-            <a:ext cx="6766078" cy="4927601"/>
-          </a:xfrm>
-        </p:spPr>
-        <p:txBody>
-          <a:bodyPr anchor="ctr">
-            <a:normAutofit/>
-          </a:bodyPr>
-          <a:lstStyle/>
-          <a:p>
-            <a:pPr algn="l"/>
-            <a:r>
-              <a:rPr lang="en-US" sz="4800">
-                <a:solidFill>
-                  <a:schemeClr val="bg1"/>
-                </a:solidFill>
-                <a:cs typeface="Calibri Light"/>
-              </a:rPr>
-              <a:t>Thank You!</a:t>
-            </a:r>
-            <a:endParaRPr lang="en-US" sz="4800">
-              <a:solidFill>
-                <a:schemeClr val="bg1"/>
-              </a:solidFill>
-            </a:endParaRPr>
-          </a:p>
-        </p:txBody>
-      </p:sp>
-      <p:sp>
-        <p:nvSpPr>
-          <p:cNvPr id="3" name="Subtitle 2">
-            <a:extLst>
-              <a:ext uri="{FF2B5EF4-FFF2-40B4-BE49-F238E27FC236}">
-                <a16:creationId xmlns:a16="http://schemas.microsoft.com/office/drawing/2014/main" id="{19B138B5-D797-4CAD-A4E5-9EA921DC28A6}"/>
-              </a:ext>
-            </a:extLst>
-          </p:cNvPr>
-          <p:cNvSpPr>
-            <a:spLocks noGrp="1"/>
-          </p:cNvSpPr>
-          <p:nvPr>
-            <p:ph type="subTitle" idx="1"/>
-          </p:nvPr>
-        </p:nvSpPr>
-        <p:spPr>
-          <a:xfrm>
-            <a:off x="1023257" y="965198"/>
-            <a:ext cx="2707937" cy="4927602"/>
-          </a:xfrm>
-        </p:spPr>
-        <p:txBody>
-          <a:bodyPr vert="horz" lIns="91440" tIns="45720" rIns="91440" bIns="45720" rtlCol="0" anchor="ctr">
-            <a:normAutofit/>
-          </a:bodyPr>
-          <a:lstStyle/>
-          <a:p>
-            <a:pPr algn="r"/>
-            <a:r>
-              <a:rPr lang="en-US" sz="2000">
-                <a:solidFill>
-                  <a:srgbClr val="FFC000"/>
-                </a:solidFill>
-                <a:cs typeface="Calibri"/>
-              </a:rPr>
-              <a:t>Any Questions?</a:t>
-            </a:r>
-            <a:endParaRPr lang="en-US" sz="2000">
-              <a:solidFill>
-                <a:srgbClr val="FFC000"/>
-              </a:solidFill>
-            </a:endParaRPr>
-          </a:p>
-        </p:txBody>
-      </p:sp>
-      <p:cxnSp>
-        <p:nvCxnSpPr>
-          <p:cNvPr id="6" name="Straight Connector 9">
-            <a:extLst>
-              <a:ext uri="{FF2B5EF4-FFF2-40B4-BE49-F238E27FC236}">
-                <a16:creationId xmlns:a16="http://schemas.microsoft.com/office/drawing/2014/main" id="{DC1572D0-F0FD-4D84-8F82-DC59140EB9BB}"/>
-              </a:ext>
-              <a:ext uri="{C183D7F6-B498-43B3-948B-1728B52AA6E4}">
-                <adec:decorative xmlns:adec="http://schemas.microsoft.com/office/drawing/2017/decorative" val="1"/>
-              </a:ext>
-            </a:extLst>
-          </p:cNvPr>
-          <p:cNvCxnSpPr>
-            <a:cxnSpLocks noGrp="1" noRot="1" noChangeAspect="1" noMove="1" noResize="1" noEditPoints="1" noAdjustHandles="1" noChangeArrowheads="1" noChangeShapeType="1"/>
-          </p:cNvCxnSpPr>
-          <p:nvPr>
-            <p:extLst>
-              <p:ext uri="{386F3935-93C4-4BCD-93E2-E3B085C9AB24}">
-                <p16:designElem xmlns:p16="http://schemas.microsoft.com/office/powerpoint/2015/main" val="1"/>
-              </p:ext>
-            </p:extLst>
-          </p:nvPr>
-        </p:nvCxnSpPr>
-        <p:spPr>
-          <a:xfrm>
-            <a:off x="4055891" y="2057399"/>
-            <a:ext cx="0" cy="2743200"/>
-          </a:xfrm>
-          <a:prstGeom prst="line">
-            <a:avLst/>
-          </a:prstGeom>
-          <a:ln w="19050">
-            <a:solidFill>
-              <a:schemeClr val="bg1"/>
-            </a:solidFill>
-          </a:ln>
-        </p:spPr>
-        <p:style>
-          <a:lnRef idx="1">
-            <a:schemeClr val="accent1"/>
-          </a:lnRef>
-          <a:fillRef idx="0">
-            <a:schemeClr val="accent1"/>
-          </a:fillRef>
-          <a:effectRef idx="0">
-            <a:schemeClr val="accent1"/>
-          </a:effectRef>
-          <a:fontRef idx="minor">
-            <a:schemeClr val="tx1"/>
-          </a:fontRef>
-        </p:style>
-      </p:cxnSp>
-      <p:pic>
-        <p:nvPicPr>
-          <p:cNvPr id="4" name="Picture 6">
-            <a:extLst>
-              <a:ext uri="{FF2B5EF4-FFF2-40B4-BE49-F238E27FC236}">
-                <a16:creationId xmlns:a16="http://schemas.microsoft.com/office/drawing/2014/main" id="{F6239E7E-25D3-487A-8F2F-EEB63518C052}"/>
-              </a:ext>
-            </a:extLst>
-          </p:cNvPr>
-          <p:cNvPicPr>
-            <a:picLocks noChangeAspect="1"/>
-          </p:cNvPicPr>
-          <p:nvPr/>
-        </p:nvPicPr>
-        <p:blipFill rotWithShape="1">
-          <a:blip r:embed="rId2"/>
-          <a:srcRect b="9873"/>
-          <a:stretch/>
-        </p:blipFill>
-        <p:spPr>
-          <a:xfrm>
-            <a:off x="8730343" y="766572"/>
-            <a:ext cx="2743200" cy="2052072"/>
-          </a:xfrm>
-          <a:prstGeom prst="rect">
-            <a:avLst/>
-          </a:prstGeom>
-        </p:spPr>
-      </p:pic>
-    </p:spTree>
-    <p:extLst>
-      <p:ext uri="{BB962C8B-B14F-4D97-AF65-F5344CB8AC3E}">
-        <p14:creationId xmlns:p14="http://schemas.microsoft.com/office/powerpoint/2010/main" val="4044572117"/>
       </p:ext>
     </p:extLst>
   </p:cSld>
@@ -15103,6 +15717,283 @@
     <p:extLst>
       <p:ext uri="{BB962C8B-B14F-4D97-AF65-F5344CB8AC3E}">
         <p14:creationId xmlns:p14="http://schemas.microsoft.com/office/powerpoint/2010/main" val="3036375602"/>
+      </p:ext>
+    </p:extLst>
+  </p:cSld>
+  <p:clrMapOvr>
+    <a:masterClrMapping/>
+  </p:clrMapOvr>
+</p:sld>
+</file>
+
+<file path=ppt/slides/slide20.xml><?xml version="1.0" encoding="utf-8"?>
+<p:sld xmlns:a="http://schemas.openxmlformats.org/drawingml/2006/main" xmlns:r="http://schemas.openxmlformats.org/officeDocument/2006/relationships" xmlns:p="http://schemas.openxmlformats.org/presentationml/2006/main">
+  <p:cSld>
+    <p:bg>
+      <p:bgPr>
+        <a:solidFill>
+          <a:schemeClr val="bg1"/>
+        </a:solidFill>
+        <a:effectLst/>
+      </p:bgPr>
+    </p:bg>
+    <p:spTree>
+      <p:nvGrpSpPr>
+        <p:cNvPr id="1" name=""/>
+        <p:cNvGrpSpPr/>
+        <p:nvPr/>
+      </p:nvGrpSpPr>
+      <p:grpSpPr>
+        <a:xfrm>
+          <a:off x="0" y="0"/>
+          <a:ext cx="0" cy="0"/>
+          <a:chOff x="0" y="0"/>
+          <a:chExt cx="0" cy="0"/>
+        </a:xfrm>
+      </p:grpSpPr>
+      <p:sp>
+        <p:nvSpPr>
+          <p:cNvPr id="5" name="Rectangle 7">
+            <a:extLst>
+              <a:ext uri="{FF2B5EF4-FFF2-40B4-BE49-F238E27FC236}">
+                <a16:creationId xmlns:a16="http://schemas.microsoft.com/office/drawing/2014/main" id="{3EDD119B-6BFA-4C3F-90CE-97DAFD604ECC}"/>
+              </a:ext>
+              <a:ext uri="{C183D7F6-B498-43B3-948B-1728B52AA6E4}">
+                <adec:decorative xmlns:adec="http://schemas.microsoft.com/office/drawing/2017/decorative" val="1"/>
+              </a:ext>
+            </a:extLst>
+          </p:cNvPr>
+          <p:cNvSpPr>
+            <a:spLocks noGrp="1" noRot="1" noChangeAspect="1" noMove="1" noResize="1" noEditPoints="1" noAdjustHandles="1" noChangeArrowheads="1" noChangeShapeType="1" noTextEdit="1"/>
+          </p:cNvSpPr>
+          <p:nvPr>
+            <p:extLst>
+              <p:ext uri="{386F3935-93C4-4BCD-93E2-E3B085C9AB24}">
+                <p16:designElem xmlns:p16="http://schemas.microsoft.com/office/powerpoint/2015/main" val="1"/>
+              </p:ext>
+            </p:extLst>
+          </p:nvPr>
+        </p:nvSpPr>
+        <p:spPr bwMode="ltGray">
+          <a:xfrm>
+            <a:off x="321564" y="320040"/>
+            <a:ext cx="11548872" cy="6217920"/>
+          </a:xfrm>
+          <a:prstGeom prst="rect">
+            <a:avLst/>
+          </a:prstGeom>
+          <a:solidFill>
+            <a:schemeClr val="tx1">
+              <a:lumMod val="75000"/>
+              <a:lumOff val="25000"/>
+            </a:schemeClr>
+          </a:solidFill>
+          <a:ln w="127000" cap="sq" cmpd="thinThick">
+            <a:noFill/>
+          </a:ln>
+        </p:spPr>
+        <p:style>
+          <a:lnRef idx="2">
+            <a:schemeClr val="accent1">
+              <a:shade val="50000"/>
+            </a:schemeClr>
+          </a:lnRef>
+          <a:fillRef idx="1">
+            <a:schemeClr val="accent1"/>
+          </a:fillRef>
+          <a:effectRef idx="0">
+            <a:schemeClr val="accent1"/>
+          </a:effectRef>
+          <a:fontRef idx="minor">
+            <a:schemeClr val="lt1"/>
+          </a:fontRef>
+        </p:style>
+        <p:txBody>
+          <a:bodyPr rtlCol="0" anchor="ctr"/>
+          <a:lstStyle/>
+          <a:p>
+            <a:pPr algn="ctr"/>
+            <a:endParaRPr lang="en-US"/>
+          </a:p>
+        </p:txBody>
+      </p:sp>
+      <p:sp>
+        <p:nvSpPr>
+          <p:cNvPr id="2" name="Title 1">
+            <a:extLst>
+              <a:ext uri="{FF2B5EF4-FFF2-40B4-BE49-F238E27FC236}">
+                <a16:creationId xmlns:a16="http://schemas.microsoft.com/office/drawing/2014/main" id="{8452AC9B-6AA6-4029-8B16-DECBEC9A4852}"/>
+              </a:ext>
+            </a:extLst>
+          </p:cNvPr>
+          <p:cNvSpPr>
+            <a:spLocks noGrp="1"/>
+          </p:cNvSpPr>
+          <p:nvPr>
+            <p:ph type="ctrTitle"/>
+          </p:nvPr>
+        </p:nvSpPr>
+        <p:spPr>
+          <a:xfrm>
+            <a:off x="4380588" y="965199"/>
+            <a:ext cx="6766078" cy="4927601"/>
+          </a:xfrm>
+        </p:spPr>
+        <p:txBody>
+          <a:bodyPr anchor="ctr">
+            <a:normAutofit/>
+          </a:bodyPr>
+          <a:lstStyle/>
+          <a:p>
+            <a:pPr algn="l"/>
+            <a:r>
+              <a:rPr lang="en-US" sz="4800">
+                <a:solidFill>
+                  <a:schemeClr val="bg1"/>
+                </a:solidFill>
+                <a:cs typeface="Calibri Light"/>
+              </a:rPr>
+              <a:t>Thank You!</a:t>
+            </a:r>
+            <a:endParaRPr lang="en-US" sz="4800">
+              <a:solidFill>
+                <a:schemeClr val="bg1"/>
+              </a:solidFill>
+            </a:endParaRPr>
+          </a:p>
+        </p:txBody>
+      </p:sp>
+      <p:sp>
+        <p:nvSpPr>
+          <p:cNvPr id="3" name="Subtitle 2">
+            <a:extLst>
+              <a:ext uri="{FF2B5EF4-FFF2-40B4-BE49-F238E27FC236}">
+                <a16:creationId xmlns:a16="http://schemas.microsoft.com/office/drawing/2014/main" id="{19B138B5-D797-4CAD-A4E5-9EA921DC28A6}"/>
+              </a:ext>
+            </a:extLst>
+          </p:cNvPr>
+          <p:cNvSpPr>
+            <a:spLocks noGrp="1"/>
+          </p:cNvSpPr>
+          <p:nvPr>
+            <p:ph type="subTitle" idx="1"/>
+          </p:nvPr>
+        </p:nvSpPr>
+        <p:spPr>
+          <a:xfrm>
+            <a:off x="1023257" y="965198"/>
+            <a:ext cx="2707937" cy="4927602"/>
+          </a:xfrm>
+        </p:spPr>
+        <p:txBody>
+          <a:bodyPr vert="horz" lIns="91440" tIns="45720" rIns="91440" bIns="45720" rtlCol="0" anchor="ctr">
+            <a:normAutofit/>
+          </a:bodyPr>
+          <a:lstStyle/>
+          <a:p>
+            <a:pPr algn="r"/>
+            <a:r>
+              <a:rPr lang="en-US" sz="2000">
+                <a:solidFill>
+                  <a:srgbClr val="FFC000"/>
+                </a:solidFill>
+                <a:cs typeface="Calibri"/>
+              </a:rPr>
+              <a:t>Any Questions?</a:t>
+            </a:r>
+            <a:endParaRPr lang="en-US" sz="2000">
+              <a:solidFill>
+                <a:srgbClr val="FFC000"/>
+              </a:solidFill>
+            </a:endParaRPr>
+          </a:p>
+        </p:txBody>
+      </p:sp>
+      <p:cxnSp>
+        <p:nvCxnSpPr>
+          <p:cNvPr id="6" name="Straight Connector 9">
+            <a:extLst>
+              <a:ext uri="{FF2B5EF4-FFF2-40B4-BE49-F238E27FC236}">
+                <a16:creationId xmlns:a16="http://schemas.microsoft.com/office/drawing/2014/main" id="{DC1572D0-F0FD-4D84-8F82-DC59140EB9BB}"/>
+              </a:ext>
+              <a:ext uri="{C183D7F6-B498-43B3-948B-1728B52AA6E4}">
+                <adec:decorative xmlns:adec="http://schemas.microsoft.com/office/drawing/2017/decorative" val="1"/>
+              </a:ext>
+            </a:extLst>
+          </p:cNvPr>
+          <p:cNvCxnSpPr>
+            <a:cxnSpLocks noGrp="1" noRot="1" noChangeAspect="1" noMove="1" noResize="1" noEditPoints="1" noAdjustHandles="1" noChangeArrowheads="1" noChangeShapeType="1"/>
+          </p:cNvCxnSpPr>
+          <p:nvPr>
+            <p:extLst>
+              <p:ext uri="{386F3935-93C4-4BCD-93E2-E3B085C9AB24}">
+                <p16:designElem xmlns:p16="http://schemas.microsoft.com/office/powerpoint/2015/main" val="1"/>
+              </p:ext>
+            </p:extLst>
+          </p:nvPr>
+        </p:nvCxnSpPr>
+        <p:spPr>
+          <a:xfrm>
+            <a:off x="4055891" y="2057399"/>
+            <a:ext cx="0" cy="2743200"/>
+          </a:xfrm>
+          <a:prstGeom prst="line">
+            <a:avLst/>
+          </a:prstGeom>
+          <a:ln w="19050">
+            <a:solidFill>
+              <a:schemeClr val="bg1"/>
+            </a:solidFill>
+          </a:ln>
+        </p:spPr>
+        <p:style>
+          <a:lnRef idx="1">
+            <a:schemeClr val="accent1"/>
+          </a:lnRef>
+          <a:fillRef idx="0">
+            <a:schemeClr val="accent1"/>
+          </a:fillRef>
+          <a:effectRef idx="0">
+            <a:schemeClr val="accent1"/>
+          </a:effectRef>
+          <a:fontRef idx="minor">
+            <a:schemeClr val="tx1"/>
+          </a:fontRef>
+        </p:style>
+      </p:cxnSp>
+      <p:pic>
+        <p:nvPicPr>
+          <p:cNvPr id="4" name="Picture 6">
+            <a:extLst>
+              <a:ext uri="{FF2B5EF4-FFF2-40B4-BE49-F238E27FC236}">
+                <a16:creationId xmlns:a16="http://schemas.microsoft.com/office/drawing/2014/main" id="{F6239E7E-25D3-487A-8F2F-EEB63518C052}"/>
+              </a:ext>
+            </a:extLst>
+          </p:cNvPr>
+          <p:cNvPicPr>
+            <a:picLocks noChangeAspect="1"/>
+          </p:cNvPicPr>
+          <p:nvPr/>
+        </p:nvPicPr>
+        <p:blipFill rotWithShape="1">
+          <a:blip r:embed="rId2"/>
+          <a:srcRect b="9873"/>
+          <a:stretch/>
+        </p:blipFill>
+        <p:spPr>
+          <a:xfrm>
+            <a:off x="8730343" y="766572"/>
+            <a:ext cx="2743200" cy="2052072"/>
+          </a:xfrm>
+          <a:prstGeom prst="rect">
+            <a:avLst/>
+          </a:prstGeom>
+        </p:spPr>
+      </p:pic>
+    </p:spTree>
+    <p:extLst>
+      <p:ext uri="{BB962C8B-B14F-4D97-AF65-F5344CB8AC3E}">
+        <p14:creationId xmlns:p14="http://schemas.microsoft.com/office/powerpoint/2010/main" val="4044572117"/>
       </p:ext>
     </p:extLst>
   </p:cSld>
@@ -17065,7 +17956,7 @@
           <a:p>
             <a:pPr algn="ctr"/>
             <a:r>
-              <a:rPr lang="en-US" altLang="zh-CN" sz="2600" kern="1200">
+              <a:rPr lang="en-US" altLang="zh-CN" sz="2600" kern="1200" dirty="0">
                 <a:solidFill>
                   <a:srgbClr val="FFFFFF"/>
                 </a:solidFill>
@@ -17076,7 +17967,7 @@
               <a:t>Our design</a:t>
             </a:r>
             <a:br>
-              <a:rPr lang="en-US" altLang="zh-CN" sz="2600">
+              <a:rPr lang="en-US" altLang="zh-CN" sz="2600" dirty="0">
                 <a:solidFill>
                   <a:srgbClr val="FFFFFF"/>
                 </a:solidFill>
@@ -17084,7 +17975,7 @@
               </a:rPr>
             </a:br>
             <a:r>
-              <a:rPr lang="en-US" altLang="zh-CN" sz="2600">
+              <a:rPr lang="en-US" altLang="zh-CN" sz="2600" dirty="0">
                 <a:solidFill>
                   <a:srgbClr val="FFFFFF"/>
                 </a:solidFill>
@@ -17094,7 +17985,7 @@
               <a:t>(</a:t>
             </a:r>
             <a:r>
-              <a:rPr lang="en-US" altLang="zh-CN" sz="2600" err="1">
+              <a:rPr lang="en-US" altLang="zh-CN" sz="2600" dirty="0" err="1">
                 <a:solidFill>
                   <a:srgbClr val="FFFFFF"/>
                 </a:solidFill>
@@ -17104,7 +17995,7 @@
               <a:t>DAGScheduler</a:t>
             </a:r>
             <a:r>
-              <a:rPr lang="en-US" altLang="zh-CN" sz="2600">
+              <a:rPr lang="en-US" altLang="zh-CN" sz="2600" dirty="0">
                 <a:solidFill>
                   <a:srgbClr val="FFFFFF"/>
                 </a:solidFill>
@@ -17113,7 +18004,7 @@
               </a:rPr>
               <a:t>)</a:t>
             </a:r>
-            <a:endParaRPr lang="en-US" sz="2600" kern="1200">
+            <a:endParaRPr lang="en-US" sz="2600" kern="1200" dirty="0">
               <a:solidFill>
                 <a:srgbClr val="FFFFFF"/>
               </a:solidFill>
@@ -17243,724 +18134,6 @@
 </file>
 
 <file path=ppt/slides/slide7.xml><?xml version="1.0" encoding="utf-8"?>
-<p:sld xmlns:a="http://schemas.openxmlformats.org/drawingml/2006/main" xmlns:r="http://schemas.openxmlformats.org/officeDocument/2006/relationships" xmlns:p="http://schemas.openxmlformats.org/presentationml/2006/main">
-  <p:cSld>
-    <p:bg>
-      <p:bgPr>
-        <a:solidFill>
-          <a:schemeClr val="bg1"/>
-        </a:solidFill>
-        <a:effectLst/>
-      </p:bgPr>
-    </p:bg>
-    <p:spTree>
-      <p:nvGrpSpPr>
-        <p:cNvPr id="1" name=""/>
-        <p:cNvGrpSpPr/>
-        <p:nvPr/>
-      </p:nvGrpSpPr>
-      <p:grpSpPr>
-        <a:xfrm>
-          <a:off x="0" y="0"/>
-          <a:ext cx="0" cy="0"/>
-          <a:chOff x="0" y="0"/>
-          <a:chExt cx="0" cy="0"/>
-        </a:xfrm>
-      </p:grpSpPr>
-      <p:sp>
-        <p:nvSpPr>
-          <p:cNvPr id="48" name="Rectangle 47">
-            <a:extLst>
-              <a:ext uri="{FF2B5EF4-FFF2-40B4-BE49-F238E27FC236}">
-                <a16:creationId xmlns:a16="http://schemas.microsoft.com/office/drawing/2014/main" id="{6753252F-4873-4F63-801D-CC719279A7D5}"/>
-              </a:ext>
-              <a:ext uri="{C183D7F6-B498-43B3-948B-1728B52AA6E4}">
-                <adec:decorative xmlns:adec="http://schemas.microsoft.com/office/drawing/2017/decorative" val="1"/>
-              </a:ext>
-            </a:extLst>
-          </p:cNvPr>
-          <p:cNvSpPr>
-            <a:spLocks noGrp="1" noRot="1" noChangeAspect="1" noMove="1" noResize="1" noEditPoints="1" noAdjustHandles="1" noChangeArrowheads="1" noChangeShapeType="1" noTextEdit="1"/>
-          </p:cNvSpPr>
-          <p:nvPr>
-            <p:extLst>
-              <p:ext uri="{386F3935-93C4-4BCD-93E2-E3B085C9AB24}">
-                <p16:designElem xmlns:p16="http://schemas.microsoft.com/office/powerpoint/2015/main" val="1"/>
-              </p:ext>
-            </p:extLst>
-          </p:nvPr>
-        </p:nvSpPr>
-        <p:spPr>
-          <a:xfrm>
-            <a:off x="0" y="0"/>
-            <a:ext cx="12192000" cy="6858000"/>
-          </a:xfrm>
-          <a:prstGeom prst="rect">
-            <a:avLst/>
-          </a:prstGeom>
-          <a:solidFill>
-            <a:srgbClr val="FFFFFF"/>
-          </a:solidFill>
-          <a:ln>
-            <a:noFill/>
-          </a:ln>
-        </p:spPr>
-        <p:style>
-          <a:lnRef idx="2">
-            <a:schemeClr val="accent1">
-              <a:shade val="50000"/>
-            </a:schemeClr>
-          </a:lnRef>
-          <a:fillRef idx="1">
-            <a:schemeClr val="accent1"/>
-          </a:fillRef>
-          <a:effectRef idx="0">
-            <a:schemeClr val="accent1"/>
-          </a:effectRef>
-          <a:fontRef idx="minor">
-            <a:schemeClr val="lt1"/>
-          </a:fontRef>
-        </p:style>
-        <p:txBody>
-          <a:bodyPr rtlCol="0" anchor="ctr"/>
-          <a:lstStyle/>
-          <a:p>
-            <a:pPr algn="ctr"/>
-            <a:endParaRPr lang="en-US"/>
-          </a:p>
-        </p:txBody>
-      </p:sp>
-      <p:sp>
-        <p:nvSpPr>
-          <p:cNvPr id="50" name="Rectangle 49">
-            <a:extLst>
-              <a:ext uri="{FF2B5EF4-FFF2-40B4-BE49-F238E27FC236}">
-                <a16:creationId xmlns:a16="http://schemas.microsoft.com/office/drawing/2014/main" id="{047C8CCB-F95D-4249-92DD-651249D3535A}"/>
-              </a:ext>
-              <a:ext uri="{C183D7F6-B498-43B3-948B-1728B52AA6E4}">
-                <adec:decorative xmlns:adec="http://schemas.microsoft.com/office/drawing/2017/decorative" val="1"/>
-              </a:ext>
-            </a:extLst>
-          </p:cNvPr>
-          <p:cNvSpPr>
-            <a:spLocks noGrp="1" noRot="1" noChangeAspect="1" noMove="1" noResize="1" noEditPoints="1" noAdjustHandles="1" noChangeArrowheads="1" noChangeShapeType="1" noTextEdit="1"/>
-          </p:cNvSpPr>
-          <p:nvPr>
-            <p:extLst>
-              <p:ext uri="{386F3935-93C4-4BCD-93E2-E3B085C9AB24}">
-                <p16:designElem xmlns:p16="http://schemas.microsoft.com/office/powerpoint/2015/main" val="1"/>
-              </p:ext>
-            </p:extLst>
-          </p:nvPr>
-        </p:nvSpPr>
-        <p:spPr>
-          <a:xfrm>
-            <a:off x="0" y="0"/>
-            <a:ext cx="2013557" cy="6858000"/>
-          </a:xfrm>
-          <a:prstGeom prst="rect">
-            <a:avLst/>
-          </a:prstGeom>
-          <a:solidFill>
-            <a:srgbClr val="7F7F7F"/>
-          </a:solidFill>
-          <a:ln>
-            <a:noFill/>
-          </a:ln>
-        </p:spPr>
-        <p:style>
-          <a:lnRef idx="2">
-            <a:schemeClr val="accent1">
-              <a:shade val="50000"/>
-            </a:schemeClr>
-          </a:lnRef>
-          <a:fillRef idx="1">
-            <a:schemeClr val="accent1"/>
-          </a:fillRef>
-          <a:effectRef idx="0">
-            <a:schemeClr val="accent1"/>
-          </a:effectRef>
-          <a:fontRef idx="minor">
-            <a:schemeClr val="lt1"/>
-          </a:fontRef>
-        </p:style>
-        <p:txBody>
-          <a:bodyPr rtlCol="0" anchor="ctr"/>
-          <a:lstStyle/>
-          <a:p>
-            <a:pPr algn="ctr"/>
-            <a:endParaRPr lang="en-US"/>
-          </a:p>
-        </p:txBody>
-      </p:sp>
-      <p:sp>
-        <p:nvSpPr>
-          <p:cNvPr id="2" name="Title 1">
-            <a:extLst>
-              <a:ext uri="{FF2B5EF4-FFF2-40B4-BE49-F238E27FC236}">
-                <a16:creationId xmlns:a16="http://schemas.microsoft.com/office/drawing/2014/main" id="{29B58D0B-30E3-49BB-8913-49B1168A4CDC}"/>
-              </a:ext>
-            </a:extLst>
-          </p:cNvPr>
-          <p:cNvSpPr>
-            <a:spLocks noGrp="1"/>
-          </p:cNvSpPr>
-          <p:nvPr>
-            <p:ph type="title"/>
-          </p:nvPr>
-        </p:nvSpPr>
-        <p:spPr>
-          <a:xfrm>
-            <a:off x="640080" y="2074363"/>
-            <a:ext cx="2752354" cy="2709275"/>
-          </a:xfrm>
-          <a:prstGeom prst="ellipse">
-            <a:avLst/>
-          </a:prstGeom>
-          <a:solidFill>
-            <a:srgbClr val="262626"/>
-          </a:solidFill>
-          <a:ln w="174625" cmpd="thinThick">
-            <a:solidFill>
-              <a:srgbClr val="262626"/>
-            </a:solidFill>
-          </a:ln>
-        </p:spPr>
-        <p:txBody>
-          <a:bodyPr vert="horz" lIns="91440" tIns="45720" rIns="91440" bIns="45720" rtlCol="0" anchor="ctr">
-            <a:normAutofit/>
-          </a:bodyPr>
-          <a:lstStyle/>
-          <a:p>
-            <a:pPr algn="ctr"/>
-            <a:r>
-              <a:rPr lang="en-US" altLang="zh-CN" sz="2600" kern="1200">
-                <a:solidFill>
-                  <a:srgbClr val="FFFFFF"/>
-                </a:solidFill>
-                <a:latin typeface="+mj-lt"/>
-                <a:ea typeface="等线 Light"/>
-                <a:cs typeface="+mj-cs"/>
-              </a:rPr>
-              <a:t>Our design</a:t>
-            </a:r>
-            <a:br>
-              <a:rPr lang="en-US" altLang="zh-CN" sz="2600">
-                <a:solidFill>
-                  <a:srgbClr val="FFFFFF"/>
-                </a:solidFill>
-                <a:ea typeface="等线 Light"/>
-              </a:rPr>
-            </a:br>
-            <a:r>
-              <a:rPr lang="en-US" altLang="zh-CN" sz="2600">
-                <a:solidFill>
-                  <a:srgbClr val="FFFFFF"/>
-                </a:solidFill>
-                <a:ea typeface="等线 Light"/>
-                <a:cs typeface="Calibri Light"/>
-              </a:rPr>
-              <a:t>(</a:t>
-            </a:r>
-            <a:r>
-              <a:rPr lang="en-US" altLang="zh-CN" sz="2600" err="1">
-                <a:solidFill>
-                  <a:srgbClr val="FFFFFF"/>
-                </a:solidFill>
-                <a:ea typeface="等线 Light"/>
-                <a:cs typeface="Calibri Light"/>
-              </a:rPr>
-              <a:t>SortShuffleManager</a:t>
-            </a:r>
-            <a:r>
-              <a:rPr lang="en-US" altLang="zh-CN" sz="2600">
-                <a:solidFill>
-                  <a:srgbClr val="FFFFFF"/>
-                </a:solidFill>
-                <a:ea typeface="等线 Light"/>
-                <a:cs typeface="Calibri Light"/>
-              </a:rPr>
-              <a:t>)</a:t>
-            </a:r>
-            <a:endParaRPr lang="en-US" sz="2600" kern="1200">
-              <a:solidFill>
-                <a:srgbClr val="FFFFFF"/>
-              </a:solidFill>
-              <a:latin typeface="+mj-lt"/>
-              <a:ea typeface="+mj-ea"/>
-              <a:cs typeface="+mj-cs"/>
-            </a:endParaRPr>
-          </a:p>
-        </p:txBody>
-      </p:sp>
-      <p:sp>
-        <p:nvSpPr>
-          <p:cNvPr id="4" name="TextBox 3">
-            <a:extLst>
-              <a:ext uri="{FF2B5EF4-FFF2-40B4-BE49-F238E27FC236}">
-                <a16:creationId xmlns:a16="http://schemas.microsoft.com/office/drawing/2014/main" id="{2E7EBC9A-DD55-4E80-846B-2A51D7D58B2F}"/>
-              </a:ext>
-            </a:extLst>
-          </p:cNvPr>
-          <p:cNvSpPr txBox="1"/>
-          <p:nvPr/>
-        </p:nvSpPr>
-        <p:spPr>
-          <a:xfrm>
-            <a:off x="1524000" y="1525638"/>
-            <a:ext cx="9144000" cy="420001"/>
-          </a:xfrm>
-          <a:prstGeom prst="rect">
-            <a:avLst/>
-          </a:prstGeom>
-        </p:spPr>
-        <p:txBody>
-          <a:bodyPr rot="0" spcFirstLastPara="0" vertOverflow="overflow" horzOverflow="overflow" vert="horz" lIns="91440" tIns="45720" rIns="91440" bIns="45720" numCol="1" spcCol="0" rtlCol="0" fromWordArt="0" anchor="t" anchorCtr="0" forceAA="0" compatLnSpc="1">
-            <a:prstTxWarp prst="textNoShape">
-              <a:avLst/>
-            </a:prstTxWarp>
-            <a:normAutofit/>
-          </a:bodyPr>
-          <a:lstStyle/>
-          <a:p>
-            <a:pPr algn="ctr">
-              <a:lnSpc>
-                <a:spcPct val="90000"/>
-              </a:lnSpc>
-              <a:spcBef>
-                <a:spcPts val="1000"/>
-              </a:spcBef>
-            </a:pPr>
-            <a:endParaRPr lang="en-US" sz="2000" b="1" kern="1200">
-              <a:solidFill>
-                <a:srgbClr val="E7E6E6"/>
-              </a:solidFill>
-              <a:latin typeface="+mn-lt"/>
-              <a:cs typeface="Calibri"/>
-            </a:endParaRPr>
-          </a:p>
-        </p:txBody>
-      </p:sp>
-      <p:pic>
-        <p:nvPicPr>
-          <p:cNvPr id="5" name="Picture 5" descr="A screenshot of a cell phone&#10;&#10;Description generated with high confidence">
-            <a:extLst>
-              <a:ext uri="{FF2B5EF4-FFF2-40B4-BE49-F238E27FC236}">
-                <a16:creationId xmlns:a16="http://schemas.microsoft.com/office/drawing/2014/main" id="{472F98FA-0BF8-45D9-996B-EDCBC3F3027F}"/>
-              </a:ext>
-            </a:extLst>
-          </p:cNvPr>
-          <p:cNvPicPr>
-            <a:picLocks noChangeAspect="1"/>
-          </p:cNvPicPr>
-          <p:nvPr/>
-        </p:nvPicPr>
-        <p:blipFill>
-          <a:blip r:embed="rId3"/>
-          <a:stretch>
-            <a:fillRect/>
-          </a:stretch>
-        </p:blipFill>
-        <p:spPr>
-          <a:xfrm>
-            <a:off x="3732363" y="789849"/>
-            <a:ext cx="7962179" cy="5220793"/>
-          </a:xfrm>
-          <a:prstGeom prst="rect">
-            <a:avLst/>
-          </a:prstGeom>
-        </p:spPr>
-      </p:pic>
-    </p:spTree>
-    <p:extLst>
-      <p:ext uri="{BB962C8B-B14F-4D97-AF65-F5344CB8AC3E}">
-        <p14:creationId xmlns:p14="http://schemas.microsoft.com/office/powerpoint/2010/main" val="1095464698"/>
-      </p:ext>
-    </p:extLst>
-  </p:cSld>
-  <p:clrMapOvr>
-    <a:masterClrMapping/>
-  </p:clrMapOvr>
-  <p:timing>
-    <p:tnLst>
-      <p:par>
-        <p:cTn id="1" dur="indefinite" restart="never" nodeType="tmRoot">
-          <p:childTnLst>
-            <p:seq concurrent="1" nextAc="seek">
-              <p:cTn id="2" dur="indefinite" nodeType="mainSeq"/>
-              <p:prevCondLst>
-                <p:cond evt="onPrev" delay="0">
-                  <p:tgtEl>
-                    <p:sldTgt/>
-                  </p:tgtEl>
-                </p:cond>
-              </p:prevCondLst>
-              <p:nextCondLst>
-                <p:cond evt="onNext" delay="0">
-                  <p:tgtEl>
-                    <p:sldTgt/>
-                  </p:tgtEl>
-                </p:cond>
-              </p:nextCondLst>
-            </p:seq>
-          </p:childTnLst>
-        </p:cTn>
-      </p:par>
-    </p:tnLst>
-  </p:timing>
-</p:sld>
-</file>
-
-<file path=ppt/slides/slide8.xml><?xml version="1.0" encoding="utf-8"?>
-<p:sld xmlns:a="http://schemas.openxmlformats.org/drawingml/2006/main" xmlns:r="http://schemas.openxmlformats.org/officeDocument/2006/relationships" xmlns:p="http://schemas.openxmlformats.org/presentationml/2006/main">
-  <p:cSld>
-    <p:bg>
-      <p:bgPr>
-        <a:solidFill>
-          <a:schemeClr val="bg1"/>
-        </a:solidFill>
-        <a:effectLst/>
-      </p:bgPr>
-    </p:bg>
-    <p:spTree>
-      <p:nvGrpSpPr>
-        <p:cNvPr id="1" name=""/>
-        <p:cNvGrpSpPr/>
-        <p:nvPr/>
-      </p:nvGrpSpPr>
-      <p:grpSpPr>
-        <a:xfrm>
-          <a:off x="0" y="0"/>
-          <a:ext cx="0" cy="0"/>
-          <a:chOff x="0" y="0"/>
-          <a:chExt cx="0" cy="0"/>
-        </a:xfrm>
-      </p:grpSpPr>
-      <p:sp>
-        <p:nvSpPr>
-          <p:cNvPr id="48" name="Rectangle 47">
-            <a:extLst>
-              <a:ext uri="{FF2B5EF4-FFF2-40B4-BE49-F238E27FC236}">
-                <a16:creationId xmlns:a16="http://schemas.microsoft.com/office/drawing/2014/main" id="{6753252F-4873-4F63-801D-CC719279A7D5}"/>
-              </a:ext>
-              <a:ext uri="{C183D7F6-B498-43B3-948B-1728B52AA6E4}">
-                <adec:decorative xmlns:adec="http://schemas.microsoft.com/office/drawing/2017/decorative" val="1"/>
-              </a:ext>
-            </a:extLst>
-          </p:cNvPr>
-          <p:cNvSpPr>
-            <a:spLocks noGrp="1" noRot="1" noChangeAspect="1" noMove="1" noResize="1" noEditPoints="1" noAdjustHandles="1" noChangeArrowheads="1" noChangeShapeType="1" noTextEdit="1"/>
-          </p:cNvSpPr>
-          <p:nvPr>
-            <p:extLst>
-              <p:ext uri="{386F3935-93C4-4BCD-93E2-E3B085C9AB24}">
-                <p16:designElem xmlns:p16="http://schemas.microsoft.com/office/powerpoint/2015/main" val="1"/>
-              </p:ext>
-            </p:extLst>
-          </p:nvPr>
-        </p:nvSpPr>
-        <p:spPr>
-          <a:xfrm>
-            <a:off x="0" y="0"/>
-            <a:ext cx="12192000" cy="6858000"/>
-          </a:xfrm>
-          <a:prstGeom prst="rect">
-            <a:avLst/>
-          </a:prstGeom>
-          <a:solidFill>
-            <a:srgbClr val="FFFFFF"/>
-          </a:solidFill>
-          <a:ln>
-            <a:noFill/>
-          </a:ln>
-        </p:spPr>
-        <p:style>
-          <a:lnRef idx="2">
-            <a:schemeClr val="accent1">
-              <a:shade val="50000"/>
-            </a:schemeClr>
-          </a:lnRef>
-          <a:fillRef idx="1">
-            <a:schemeClr val="accent1"/>
-          </a:fillRef>
-          <a:effectRef idx="0">
-            <a:schemeClr val="accent1"/>
-          </a:effectRef>
-          <a:fontRef idx="minor">
-            <a:schemeClr val="lt1"/>
-          </a:fontRef>
-        </p:style>
-        <p:txBody>
-          <a:bodyPr rtlCol="0" anchor="ctr"/>
-          <a:lstStyle/>
-          <a:p>
-            <a:pPr algn="ctr"/>
-            <a:endParaRPr lang="en-US"/>
-          </a:p>
-        </p:txBody>
-      </p:sp>
-      <p:sp>
-        <p:nvSpPr>
-          <p:cNvPr id="50" name="Rectangle 49">
-            <a:extLst>
-              <a:ext uri="{FF2B5EF4-FFF2-40B4-BE49-F238E27FC236}">
-                <a16:creationId xmlns:a16="http://schemas.microsoft.com/office/drawing/2014/main" id="{047C8CCB-F95D-4249-92DD-651249D3535A}"/>
-              </a:ext>
-              <a:ext uri="{C183D7F6-B498-43B3-948B-1728B52AA6E4}">
-                <adec:decorative xmlns:adec="http://schemas.microsoft.com/office/drawing/2017/decorative" val="1"/>
-              </a:ext>
-            </a:extLst>
-          </p:cNvPr>
-          <p:cNvSpPr>
-            <a:spLocks noGrp="1" noRot="1" noChangeAspect="1" noMove="1" noResize="1" noEditPoints="1" noAdjustHandles="1" noChangeArrowheads="1" noChangeShapeType="1" noTextEdit="1"/>
-          </p:cNvSpPr>
-          <p:nvPr>
-            <p:extLst>
-              <p:ext uri="{386F3935-93C4-4BCD-93E2-E3B085C9AB24}">
-                <p16:designElem xmlns:p16="http://schemas.microsoft.com/office/powerpoint/2015/main" val="1"/>
-              </p:ext>
-            </p:extLst>
-          </p:nvPr>
-        </p:nvSpPr>
-        <p:spPr>
-          <a:xfrm>
-            <a:off x="0" y="0"/>
-            <a:ext cx="2013557" cy="6858000"/>
-          </a:xfrm>
-          <a:prstGeom prst="rect">
-            <a:avLst/>
-          </a:prstGeom>
-          <a:solidFill>
-            <a:srgbClr val="7F7F7F"/>
-          </a:solidFill>
-          <a:ln>
-            <a:noFill/>
-          </a:ln>
-        </p:spPr>
-        <p:style>
-          <a:lnRef idx="2">
-            <a:schemeClr val="accent1">
-              <a:shade val="50000"/>
-            </a:schemeClr>
-          </a:lnRef>
-          <a:fillRef idx="1">
-            <a:schemeClr val="accent1"/>
-          </a:fillRef>
-          <a:effectRef idx="0">
-            <a:schemeClr val="accent1"/>
-          </a:effectRef>
-          <a:fontRef idx="minor">
-            <a:schemeClr val="lt1"/>
-          </a:fontRef>
-        </p:style>
-        <p:txBody>
-          <a:bodyPr rtlCol="0" anchor="ctr"/>
-          <a:lstStyle/>
-          <a:p>
-            <a:pPr algn="ctr"/>
-            <a:endParaRPr lang="en-US"/>
-          </a:p>
-        </p:txBody>
-      </p:sp>
-      <p:sp>
-        <p:nvSpPr>
-          <p:cNvPr id="2" name="Title 1">
-            <a:extLst>
-              <a:ext uri="{FF2B5EF4-FFF2-40B4-BE49-F238E27FC236}">
-                <a16:creationId xmlns:a16="http://schemas.microsoft.com/office/drawing/2014/main" id="{29B58D0B-30E3-49BB-8913-49B1168A4CDC}"/>
-              </a:ext>
-            </a:extLst>
-          </p:cNvPr>
-          <p:cNvSpPr>
-            <a:spLocks noGrp="1"/>
-          </p:cNvSpPr>
-          <p:nvPr>
-            <p:ph type="title"/>
-          </p:nvPr>
-        </p:nvSpPr>
-        <p:spPr>
-          <a:xfrm>
-            <a:off x="640080" y="2074363"/>
-            <a:ext cx="2752354" cy="2709275"/>
-          </a:xfrm>
-          <a:prstGeom prst="ellipse">
-            <a:avLst/>
-          </a:prstGeom>
-          <a:solidFill>
-            <a:srgbClr val="262626"/>
-          </a:solidFill>
-          <a:ln w="174625" cmpd="thinThick">
-            <a:solidFill>
-              <a:srgbClr val="262626"/>
-            </a:solidFill>
-          </a:ln>
-        </p:spPr>
-        <p:txBody>
-          <a:bodyPr vert="horz" lIns="91440" tIns="45720" rIns="91440" bIns="45720" rtlCol="0" anchor="ctr">
-            <a:normAutofit/>
-          </a:bodyPr>
-          <a:lstStyle/>
-          <a:p>
-            <a:pPr algn="ctr"/>
-            <a:r>
-              <a:rPr lang="en-US" altLang="zh-CN" sz="2600" kern="1200">
-                <a:solidFill>
-                  <a:srgbClr val="FFFFFF"/>
-                </a:solidFill>
-                <a:latin typeface="+mj-lt"/>
-                <a:ea typeface="等线 Light"/>
-                <a:cs typeface="+mj-cs"/>
-              </a:rPr>
-              <a:t>Our design</a:t>
-            </a:r>
-            <a:br>
-              <a:rPr lang="en-US" altLang="zh-CN" sz="2600">
-                <a:solidFill>
-                  <a:srgbClr val="FFFFFF"/>
-                </a:solidFill>
-                <a:ea typeface="等线 Light"/>
-              </a:rPr>
-            </a:br>
-            <a:r>
-              <a:rPr lang="en-US" altLang="zh-CN" sz="2600">
-                <a:solidFill>
-                  <a:srgbClr val="FFFFFF"/>
-                </a:solidFill>
-                <a:ea typeface="等线 Light"/>
-                <a:cs typeface="Calibri Light"/>
-              </a:rPr>
-              <a:t>(Achieved so far)</a:t>
-            </a:r>
-            <a:endParaRPr lang="en-US" sz="2600" kern="1200">
-              <a:solidFill>
-                <a:srgbClr val="FFFFFF"/>
-              </a:solidFill>
-              <a:latin typeface="+mj-lt"/>
-              <a:ea typeface="+mj-ea"/>
-              <a:cs typeface="+mj-cs"/>
-            </a:endParaRPr>
-          </a:p>
-        </p:txBody>
-      </p:sp>
-      <p:sp>
-        <p:nvSpPr>
-          <p:cNvPr id="4" name="TextBox 3">
-            <a:extLst>
-              <a:ext uri="{FF2B5EF4-FFF2-40B4-BE49-F238E27FC236}">
-                <a16:creationId xmlns:a16="http://schemas.microsoft.com/office/drawing/2014/main" id="{2E7EBC9A-DD55-4E80-846B-2A51D7D58B2F}"/>
-              </a:ext>
-            </a:extLst>
-          </p:cNvPr>
-          <p:cNvSpPr txBox="1"/>
-          <p:nvPr/>
-        </p:nvSpPr>
-        <p:spPr>
-          <a:xfrm>
-            <a:off x="1524000" y="1525638"/>
-            <a:ext cx="9144000" cy="420001"/>
-          </a:xfrm>
-          <a:prstGeom prst="rect">
-            <a:avLst/>
-          </a:prstGeom>
-        </p:spPr>
-        <p:txBody>
-          <a:bodyPr rot="0" spcFirstLastPara="0" vertOverflow="overflow" horzOverflow="overflow" vert="horz" lIns="91440" tIns="45720" rIns="91440" bIns="45720" numCol="1" spcCol="0" rtlCol="0" fromWordArt="0" anchor="t" anchorCtr="0" forceAA="0" compatLnSpc="1">
-            <a:prstTxWarp prst="textNoShape">
-              <a:avLst/>
-            </a:prstTxWarp>
-            <a:normAutofit/>
-          </a:bodyPr>
-          <a:lstStyle/>
-          <a:p>
-            <a:pPr algn="ctr">
-              <a:lnSpc>
-                <a:spcPct val="90000"/>
-              </a:lnSpc>
-              <a:spcBef>
-                <a:spcPts val="1000"/>
-              </a:spcBef>
-            </a:pPr>
-            <a:endParaRPr lang="en-US" sz="2000" b="1" kern="1200">
-              <a:solidFill>
-                <a:srgbClr val="E7E6E6"/>
-              </a:solidFill>
-              <a:latin typeface="+mn-lt"/>
-              <a:cs typeface="Calibri"/>
-            </a:endParaRPr>
-          </a:p>
-        </p:txBody>
-      </p:sp>
-      <p:pic>
-        <p:nvPicPr>
-          <p:cNvPr id="3" name="Picture 5">
-            <a:extLst>
-              <a:ext uri="{FF2B5EF4-FFF2-40B4-BE49-F238E27FC236}">
-                <a16:creationId xmlns:a16="http://schemas.microsoft.com/office/drawing/2014/main" id="{8DCDE275-4C0F-400E-BB7C-D92E98BAAFEA}"/>
-              </a:ext>
-            </a:extLst>
-          </p:cNvPr>
-          <p:cNvPicPr>
-            <a:picLocks noChangeAspect="1"/>
-          </p:cNvPicPr>
-          <p:nvPr/>
-        </p:nvPicPr>
-        <p:blipFill>
-          <a:blip r:embed="rId3"/>
-          <a:stretch>
-            <a:fillRect/>
-          </a:stretch>
-        </p:blipFill>
-        <p:spPr>
-          <a:xfrm>
-            <a:off x="4724400" y="542027"/>
-            <a:ext cx="5474898" cy="5357002"/>
-          </a:xfrm>
-          <a:prstGeom prst="rect">
-            <a:avLst/>
-          </a:prstGeom>
-        </p:spPr>
-      </p:pic>
-    </p:spTree>
-    <p:extLst>
-      <p:ext uri="{BB962C8B-B14F-4D97-AF65-F5344CB8AC3E}">
-        <p14:creationId xmlns:p14="http://schemas.microsoft.com/office/powerpoint/2010/main" val="3734227668"/>
-      </p:ext>
-    </p:extLst>
-  </p:cSld>
-  <p:clrMapOvr>
-    <a:masterClrMapping/>
-  </p:clrMapOvr>
-  <p:timing>
-    <p:tnLst>
-      <p:par>
-        <p:cTn id="1" dur="indefinite" restart="never" nodeType="tmRoot">
-          <p:childTnLst>
-            <p:seq concurrent="1" nextAc="seek">
-              <p:cTn id="2" dur="indefinite" nodeType="mainSeq"/>
-              <p:prevCondLst>
-                <p:cond evt="onPrev" delay="0">
-                  <p:tgtEl>
-                    <p:sldTgt/>
-                  </p:tgtEl>
-                </p:cond>
-              </p:prevCondLst>
-              <p:nextCondLst>
-                <p:cond evt="onNext" delay="0">
-                  <p:tgtEl>
-                    <p:sldTgt/>
-                  </p:tgtEl>
-                </p:cond>
-              </p:nextCondLst>
-            </p:seq>
-          </p:childTnLst>
-        </p:cTn>
-      </p:par>
-    </p:tnLst>
-  </p:timing>
-</p:sld>
-</file>
-
-<file path=ppt/slides/slide9.xml><?xml version="1.0" encoding="utf-8"?>
 <p:sld xmlns:a="http://schemas.openxmlformats.org/drawingml/2006/main" xmlns:r="http://schemas.openxmlformats.org/officeDocument/2006/relationships" xmlns:p="http://schemas.openxmlformats.org/presentationml/2006/main">
   <p:cSld>
     <p:bg>
@@ -18109,16 +18282,26 @@
           <a:p>
             <a:pPr algn="ctr"/>
             <a:r>
-              <a:rPr lang="en-US" sz="5400" err="1">
+              <a:rPr lang="en-US" sz="5400" dirty="0" err="1">
                 <a:solidFill>
                   <a:schemeClr val="bg1"/>
                 </a:solidFill>
                 <a:ea typeface="+mj-lt"/>
                 <a:cs typeface="+mj-lt"/>
               </a:rPr>
-              <a:t>registerNWayMergeShuffle</a:t>
+              <a:t>DAGScheduler</a:t>
             </a:r>
-            <a:endParaRPr lang="en-US" err="1">
+            <a:r>
+              <a:rPr lang="en-US" sz="5400" dirty="0">
+                <a:solidFill>
+                  <a:schemeClr val="bg1"/>
+                </a:solidFill>
+                <a:ea typeface="+mj-lt"/>
+                <a:cs typeface="+mj-lt"/>
+              </a:rPr>
+              <a:t> event handler</a:t>
+            </a:r>
+            <a:endParaRPr lang="en-US" dirty="0" err="1">
               <a:solidFill>
                 <a:schemeClr val="bg1"/>
               </a:solidFill>
@@ -18229,10 +18412,10 @@
       </p:cxnSp>
       <p:pic>
         <p:nvPicPr>
-          <p:cNvPr id="3" name="Picture 4" descr="A picture containing laptop, table, food, holding&#10;&#10;Description generated with very high confidence">
+          <p:cNvPr id="5" name="Picture 5" descr="A screenshot of a cell phone&#10;&#10;Description generated with very high confidence">
             <a:extLst>
               <a:ext uri="{FF2B5EF4-FFF2-40B4-BE49-F238E27FC236}">
-                <a16:creationId xmlns:a16="http://schemas.microsoft.com/office/drawing/2014/main" id="{B0585180-C170-436D-A8C8-13AE78DF68FF}"/>
+                <a16:creationId xmlns:a16="http://schemas.microsoft.com/office/drawing/2014/main" id="{69EAAA67-6745-4DE9-A8D3-143CBC896334}"/>
               </a:ext>
             </a:extLst>
           </p:cNvPr>
@@ -18249,8 +18432,8 @@
         </p:blipFill>
         <p:spPr>
           <a:xfrm>
-            <a:off x="1331344" y="3163482"/>
-            <a:ext cx="10061274" cy="2817037"/>
+            <a:off x="1863306" y="2534138"/>
+            <a:ext cx="8407878" cy="3917572"/>
           </a:xfrm>
           <a:prstGeom prst="rect">
             <a:avLst/>
@@ -18260,7 +18443,708 @@
     </p:spTree>
     <p:extLst>
       <p:ext uri="{BB962C8B-B14F-4D97-AF65-F5344CB8AC3E}">
-        <p14:creationId xmlns:p14="http://schemas.microsoft.com/office/powerpoint/2010/main" val="3445368243"/>
+        <p14:creationId xmlns:p14="http://schemas.microsoft.com/office/powerpoint/2010/main" val="3001294855"/>
+      </p:ext>
+    </p:extLst>
+  </p:cSld>
+  <p:clrMapOvr>
+    <a:masterClrMapping/>
+  </p:clrMapOvr>
+  <p:timing>
+    <p:tnLst>
+      <p:par>
+        <p:cTn id="1" dur="indefinite" restart="never" nodeType="tmRoot">
+          <p:childTnLst>
+            <p:seq concurrent="1" nextAc="seek">
+              <p:cTn id="2" dur="indefinite" nodeType="mainSeq"/>
+              <p:prevCondLst>
+                <p:cond evt="onPrev" delay="0">
+                  <p:tgtEl>
+                    <p:sldTgt/>
+                  </p:tgtEl>
+                </p:cond>
+              </p:prevCondLst>
+              <p:nextCondLst>
+                <p:cond evt="onNext" delay="0">
+                  <p:tgtEl>
+                    <p:sldTgt/>
+                  </p:tgtEl>
+                </p:cond>
+              </p:nextCondLst>
+            </p:seq>
+          </p:childTnLst>
+        </p:cTn>
+      </p:par>
+    </p:tnLst>
+  </p:timing>
+</p:sld>
+</file>
+
+<file path=ppt/slides/slide8.xml><?xml version="1.0" encoding="utf-8"?>
+<p:sld xmlns:a="http://schemas.openxmlformats.org/drawingml/2006/main" xmlns:r="http://schemas.openxmlformats.org/officeDocument/2006/relationships" xmlns:p="http://schemas.openxmlformats.org/presentationml/2006/main">
+  <p:cSld>
+    <p:bg>
+      <p:bgPr>
+        <a:solidFill>
+          <a:schemeClr val="bg1"/>
+        </a:solidFill>
+        <a:effectLst/>
+      </p:bgPr>
+    </p:bg>
+    <p:spTree>
+      <p:nvGrpSpPr>
+        <p:cNvPr id="1" name=""/>
+        <p:cNvGrpSpPr/>
+        <p:nvPr/>
+      </p:nvGrpSpPr>
+      <p:grpSpPr>
+        <a:xfrm>
+          <a:off x="0" y="0"/>
+          <a:ext cx="0" cy="0"/>
+          <a:chOff x="0" y="0"/>
+          <a:chExt cx="0" cy="0"/>
+        </a:xfrm>
+      </p:grpSpPr>
+      <p:sp>
+        <p:nvSpPr>
+          <p:cNvPr id="41" name="Rectangle 40">
+            <a:extLst>
+              <a:ext uri="{FF2B5EF4-FFF2-40B4-BE49-F238E27FC236}">
+                <a16:creationId xmlns:a16="http://schemas.microsoft.com/office/drawing/2014/main" id="{823AC064-BC96-4F32-8AE1-B2FD38754823}"/>
+              </a:ext>
+              <a:ext uri="{C183D7F6-B498-43B3-948B-1728B52AA6E4}">
+                <adec:decorative xmlns:adec="http://schemas.microsoft.com/office/drawing/2017/decorative" val="1"/>
+              </a:ext>
+            </a:extLst>
+          </p:cNvPr>
+          <p:cNvSpPr>
+            <a:spLocks noGrp="1" noRot="1" noChangeAspect="1" noMove="1" noResize="1" noEditPoints="1" noAdjustHandles="1" noChangeArrowheads="1" noChangeShapeType="1" noTextEdit="1"/>
+          </p:cNvSpPr>
+          <p:nvPr>
+            <p:extLst>
+              <p:ext uri="{386F3935-93C4-4BCD-93E2-E3B085C9AB24}">
+                <p16:designElem xmlns:p16="http://schemas.microsoft.com/office/powerpoint/2015/main" val="1"/>
+              </p:ext>
+            </p:extLst>
+          </p:nvPr>
+        </p:nvSpPr>
+        <p:spPr bwMode="ltGray">
+          <a:xfrm>
+            <a:off x="378068" y="343486"/>
+            <a:ext cx="11438793" cy="1844256"/>
+          </a:xfrm>
+          <a:prstGeom prst="rect">
+            <a:avLst/>
+          </a:prstGeom>
+          <a:solidFill>
+            <a:srgbClr val="404040"/>
+          </a:solidFill>
+          <a:ln w="127000" cap="sq" cmpd="thinThick">
+            <a:solidFill>
+              <a:srgbClr val="404040"/>
+            </a:solidFill>
+          </a:ln>
+        </p:spPr>
+        <p:style>
+          <a:lnRef idx="2">
+            <a:schemeClr val="accent1">
+              <a:shade val="50000"/>
+            </a:schemeClr>
+          </a:lnRef>
+          <a:fillRef idx="1">
+            <a:schemeClr val="accent1"/>
+          </a:fillRef>
+          <a:effectRef idx="0">
+            <a:schemeClr val="accent1"/>
+          </a:effectRef>
+          <a:fontRef idx="minor">
+            <a:schemeClr val="lt1"/>
+          </a:fontRef>
+        </p:style>
+        <p:txBody>
+          <a:bodyPr rtlCol="0" anchor="ctr"/>
+          <a:lstStyle/>
+          <a:p>
+            <a:pPr marL="0" marR="0" lvl="0" indent="0" algn="ctr" defTabSz="914400" rtl="0" eaLnBrk="1" fontAlgn="auto" latinLnBrk="0" hangingPunct="1">
+              <a:lnSpc>
+                <a:spcPct val="100000"/>
+              </a:lnSpc>
+              <a:spcBef>
+                <a:spcPts val="0"/>
+              </a:spcBef>
+              <a:spcAft>
+                <a:spcPts val="0"/>
+              </a:spcAft>
+              <a:buClrTx/>
+              <a:buSzTx/>
+              <a:buFontTx/>
+              <a:buNone/>
+              <a:tabLst/>
+              <a:defRPr/>
+            </a:pPr>
+            <a:endParaRPr kumimoji="0" lang="en-US" sz="1800" b="0" i="0" u="none" strike="noStrike" kern="1200" cap="none" spc="0" normalizeH="0" baseline="0" noProof="0">
+              <a:ln>
+                <a:noFill/>
+              </a:ln>
+              <a:solidFill>
+                <a:prstClr val="white"/>
+              </a:solidFill>
+              <a:effectLst/>
+              <a:uLnTx/>
+              <a:uFillTx/>
+              <a:latin typeface="Calibri" panose="020F0502020204030204"/>
+              <a:ea typeface="+mn-ea"/>
+              <a:cs typeface="+mn-cs"/>
+            </a:endParaRPr>
+          </a:p>
+        </p:txBody>
+      </p:sp>
+      <p:sp>
+        <p:nvSpPr>
+          <p:cNvPr id="2" name="Title 1">
+            <a:extLst>
+              <a:ext uri="{FF2B5EF4-FFF2-40B4-BE49-F238E27FC236}">
+                <a16:creationId xmlns:a16="http://schemas.microsoft.com/office/drawing/2014/main" id="{29B58D0B-30E3-49BB-8913-49B1168A4CDC}"/>
+              </a:ext>
+            </a:extLst>
+          </p:cNvPr>
+          <p:cNvSpPr>
+            <a:spLocks noGrp="1"/>
+          </p:cNvSpPr>
+          <p:nvPr>
+            <p:ph type="title"/>
+          </p:nvPr>
+        </p:nvSpPr>
+        <p:spPr>
+          <a:xfrm>
+            <a:off x="526073" y="466578"/>
+            <a:ext cx="11139854" cy="930447"/>
+          </a:xfrm>
+        </p:spPr>
+        <p:txBody>
+          <a:bodyPr vert="horz" lIns="91440" tIns="45720" rIns="91440" bIns="45720" rtlCol="0" anchor="b">
+            <a:normAutofit/>
+          </a:bodyPr>
+          <a:lstStyle/>
+          <a:p>
+            <a:pPr algn="ctr"/>
+            <a:r>
+              <a:rPr lang="en-US" sz="5400" dirty="0" err="1">
+                <a:solidFill>
+                  <a:schemeClr val="bg1"/>
+                </a:solidFill>
+                <a:ea typeface="+mj-lt"/>
+                <a:cs typeface="+mj-lt"/>
+              </a:rPr>
+              <a:t>MapOutputTracker</a:t>
+            </a:r>
+            <a:endParaRPr lang="en-US" dirty="0" err="1"/>
+          </a:p>
+        </p:txBody>
+      </p:sp>
+      <p:sp>
+        <p:nvSpPr>
+          <p:cNvPr id="4" name="TextBox 3">
+            <a:extLst>
+              <a:ext uri="{FF2B5EF4-FFF2-40B4-BE49-F238E27FC236}">
+                <a16:creationId xmlns:a16="http://schemas.microsoft.com/office/drawing/2014/main" id="{2E7EBC9A-DD55-4E80-846B-2A51D7D58B2F}"/>
+              </a:ext>
+            </a:extLst>
+          </p:cNvPr>
+          <p:cNvSpPr txBox="1"/>
+          <p:nvPr/>
+        </p:nvSpPr>
+        <p:spPr>
+          <a:xfrm>
+            <a:off x="1524000" y="1525638"/>
+            <a:ext cx="9144000" cy="420001"/>
+          </a:xfrm>
+          <a:prstGeom prst="rect">
+            <a:avLst/>
+          </a:prstGeom>
+        </p:spPr>
+        <p:txBody>
+          <a:bodyPr rot="0" spcFirstLastPara="0" vertOverflow="overflow" horzOverflow="overflow" vert="horz" lIns="91440" tIns="45720" rIns="91440" bIns="45720" numCol="1" spcCol="0" rtlCol="0" fromWordArt="0" anchor="t" anchorCtr="0" forceAA="0" compatLnSpc="1">
+            <a:prstTxWarp prst="textNoShape">
+              <a:avLst/>
+            </a:prstTxWarp>
+            <a:normAutofit/>
+          </a:bodyPr>
+          <a:lstStyle/>
+          <a:p>
+            <a:pPr algn="ctr">
+              <a:lnSpc>
+                <a:spcPct val="90000"/>
+              </a:lnSpc>
+              <a:spcBef>
+                <a:spcPts val="1000"/>
+              </a:spcBef>
+            </a:pPr>
+            <a:endParaRPr lang="en-US" sz="2000" b="1" kern="1200">
+              <a:solidFill>
+                <a:srgbClr val="E7E6E6"/>
+              </a:solidFill>
+              <a:latin typeface="+mn-lt"/>
+              <a:cs typeface="Calibri"/>
+            </a:endParaRPr>
+          </a:p>
+        </p:txBody>
+      </p:sp>
+      <p:cxnSp>
+        <p:nvCxnSpPr>
+          <p:cNvPr id="43" name="Straight Connector 42">
+            <a:extLst>
+              <a:ext uri="{FF2B5EF4-FFF2-40B4-BE49-F238E27FC236}">
+                <a16:creationId xmlns:a16="http://schemas.microsoft.com/office/drawing/2014/main" id="{7E7C77BC-7138-40B1-A15B-20F57A494629}"/>
+              </a:ext>
+              <a:ext uri="{C183D7F6-B498-43B3-948B-1728B52AA6E4}">
+                <adec:decorative xmlns:adec="http://schemas.microsoft.com/office/drawing/2017/decorative" val="1"/>
+              </a:ext>
+            </a:extLst>
+          </p:cNvPr>
+          <p:cNvCxnSpPr>
+            <a:cxnSpLocks noGrp="1" noRot="1" noChangeAspect="1" noMove="1" noResize="1" noEditPoints="1" noAdjustHandles="1" noChangeArrowheads="1" noChangeShapeType="1"/>
+          </p:cNvCxnSpPr>
+          <p:nvPr>
+            <p:extLst>
+              <p:ext uri="{386F3935-93C4-4BCD-93E2-E3B085C9AB24}">
+                <p16:designElem xmlns:p16="http://schemas.microsoft.com/office/powerpoint/2015/main" val="1"/>
+              </p:ext>
+            </p:extLst>
+          </p:nvPr>
+        </p:nvCxnSpPr>
+        <p:spPr>
+          <a:xfrm>
+            <a:off x="2209800" y="1448631"/>
+            <a:ext cx="7772400" cy="0"/>
+          </a:xfrm>
+          <a:prstGeom prst="line">
+            <a:avLst/>
+          </a:prstGeom>
+          <a:ln w="22225">
+            <a:solidFill>
+              <a:srgbClr val="D9D9D9"/>
+            </a:solidFill>
+          </a:ln>
+        </p:spPr>
+        <p:style>
+          <a:lnRef idx="1">
+            <a:schemeClr val="accent1"/>
+          </a:lnRef>
+          <a:fillRef idx="0">
+            <a:schemeClr val="accent1"/>
+          </a:fillRef>
+          <a:effectRef idx="0">
+            <a:schemeClr val="accent1"/>
+          </a:effectRef>
+          <a:fontRef idx="minor">
+            <a:schemeClr val="tx1"/>
+          </a:fontRef>
+        </p:style>
+      </p:cxnSp>
+      <p:pic>
+        <p:nvPicPr>
+          <p:cNvPr id="3" name="Picture 5" descr="A screen shot of a computer&#10;&#10;Description generated with very high confidence">
+            <a:extLst>
+              <a:ext uri="{FF2B5EF4-FFF2-40B4-BE49-F238E27FC236}">
+                <a16:creationId xmlns:a16="http://schemas.microsoft.com/office/drawing/2014/main" id="{8B29EBB0-9E7F-4022-AABC-DAE8C0CDB066}"/>
+              </a:ext>
+            </a:extLst>
+          </p:cNvPr>
+          <p:cNvPicPr>
+            <a:picLocks noChangeAspect="1"/>
+          </p:cNvPicPr>
+          <p:nvPr/>
+        </p:nvPicPr>
+        <p:blipFill>
+          <a:blip r:embed="rId3"/>
+          <a:stretch>
+            <a:fillRect/>
+          </a:stretch>
+        </p:blipFill>
+        <p:spPr>
+          <a:xfrm>
+            <a:off x="1345721" y="2941616"/>
+            <a:ext cx="9960633" cy="3188881"/>
+          </a:xfrm>
+          <a:prstGeom prst="rect">
+            <a:avLst/>
+          </a:prstGeom>
+        </p:spPr>
+      </p:pic>
+    </p:spTree>
+    <p:extLst>
+      <p:ext uri="{BB962C8B-B14F-4D97-AF65-F5344CB8AC3E}">
+        <p14:creationId xmlns:p14="http://schemas.microsoft.com/office/powerpoint/2010/main" val="4104147926"/>
+      </p:ext>
+    </p:extLst>
+  </p:cSld>
+  <p:clrMapOvr>
+    <a:masterClrMapping/>
+  </p:clrMapOvr>
+  <p:timing>
+    <p:tnLst>
+      <p:par>
+        <p:cTn id="1" dur="indefinite" restart="never" nodeType="tmRoot">
+          <p:childTnLst>
+            <p:seq concurrent="1" nextAc="seek">
+              <p:cTn id="2" dur="indefinite" nodeType="mainSeq"/>
+              <p:prevCondLst>
+                <p:cond evt="onPrev" delay="0">
+                  <p:tgtEl>
+                    <p:sldTgt/>
+                  </p:tgtEl>
+                </p:cond>
+              </p:prevCondLst>
+              <p:nextCondLst>
+                <p:cond evt="onNext" delay="0">
+                  <p:tgtEl>
+                    <p:sldTgt/>
+                  </p:tgtEl>
+                </p:cond>
+              </p:nextCondLst>
+            </p:seq>
+          </p:childTnLst>
+        </p:cTn>
+      </p:par>
+    </p:tnLst>
+  </p:timing>
+</p:sld>
+</file>
+
+<file path=ppt/slides/slide9.xml><?xml version="1.0" encoding="utf-8"?>
+<p:sld xmlns:a="http://schemas.openxmlformats.org/drawingml/2006/main" xmlns:r="http://schemas.openxmlformats.org/officeDocument/2006/relationships" xmlns:p="http://schemas.openxmlformats.org/presentationml/2006/main">
+  <p:cSld>
+    <p:bg>
+      <p:bgPr>
+        <a:solidFill>
+          <a:schemeClr val="bg1"/>
+        </a:solidFill>
+        <a:effectLst/>
+      </p:bgPr>
+    </p:bg>
+    <p:spTree>
+      <p:nvGrpSpPr>
+        <p:cNvPr id="1" name=""/>
+        <p:cNvGrpSpPr/>
+        <p:nvPr/>
+      </p:nvGrpSpPr>
+      <p:grpSpPr>
+        <a:xfrm>
+          <a:off x="0" y="0"/>
+          <a:ext cx="0" cy="0"/>
+          <a:chOff x="0" y="0"/>
+          <a:chExt cx="0" cy="0"/>
+        </a:xfrm>
+      </p:grpSpPr>
+      <p:sp>
+        <p:nvSpPr>
+          <p:cNvPr id="48" name="Rectangle 47">
+            <a:extLst>
+              <a:ext uri="{FF2B5EF4-FFF2-40B4-BE49-F238E27FC236}">
+                <a16:creationId xmlns:a16="http://schemas.microsoft.com/office/drawing/2014/main" id="{6753252F-4873-4F63-801D-CC719279A7D5}"/>
+              </a:ext>
+              <a:ext uri="{C183D7F6-B498-43B3-948B-1728B52AA6E4}">
+                <adec:decorative xmlns:adec="http://schemas.microsoft.com/office/drawing/2017/decorative" val="1"/>
+              </a:ext>
+            </a:extLst>
+          </p:cNvPr>
+          <p:cNvSpPr>
+            <a:spLocks noGrp="1" noRot="1" noChangeAspect="1" noMove="1" noResize="1" noEditPoints="1" noAdjustHandles="1" noChangeArrowheads="1" noChangeShapeType="1" noTextEdit="1"/>
+          </p:cNvSpPr>
+          <p:nvPr>
+            <p:extLst>
+              <p:ext uri="{386F3935-93C4-4BCD-93E2-E3B085C9AB24}">
+                <p16:designElem xmlns:p16="http://schemas.microsoft.com/office/powerpoint/2015/main" val="1"/>
+              </p:ext>
+            </p:extLst>
+          </p:nvPr>
+        </p:nvSpPr>
+        <p:spPr>
+          <a:xfrm>
+            <a:off x="0" y="0"/>
+            <a:ext cx="12192000" cy="6858000"/>
+          </a:xfrm>
+          <a:prstGeom prst="rect">
+            <a:avLst/>
+          </a:prstGeom>
+          <a:solidFill>
+            <a:srgbClr val="FFFFFF"/>
+          </a:solidFill>
+          <a:ln>
+            <a:noFill/>
+          </a:ln>
+        </p:spPr>
+        <p:style>
+          <a:lnRef idx="2">
+            <a:schemeClr val="accent1">
+              <a:shade val="50000"/>
+            </a:schemeClr>
+          </a:lnRef>
+          <a:fillRef idx="1">
+            <a:schemeClr val="accent1"/>
+          </a:fillRef>
+          <a:effectRef idx="0">
+            <a:schemeClr val="accent1"/>
+          </a:effectRef>
+          <a:fontRef idx="minor">
+            <a:schemeClr val="lt1"/>
+          </a:fontRef>
+        </p:style>
+        <p:txBody>
+          <a:bodyPr rtlCol="0" anchor="ctr"/>
+          <a:lstStyle/>
+          <a:p>
+            <a:pPr algn="ctr"/>
+            <a:endParaRPr lang="en-US"/>
+          </a:p>
+        </p:txBody>
+      </p:sp>
+      <p:sp>
+        <p:nvSpPr>
+          <p:cNvPr id="50" name="Rectangle 49">
+            <a:extLst>
+              <a:ext uri="{FF2B5EF4-FFF2-40B4-BE49-F238E27FC236}">
+                <a16:creationId xmlns:a16="http://schemas.microsoft.com/office/drawing/2014/main" id="{047C8CCB-F95D-4249-92DD-651249D3535A}"/>
+              </a:ext>
+              <a:ext uri="{C183D7F6-B498-43B3-948B-1728B52AA6E4}">
+                <adec:decorative xmlns:adec="http://schemas.microsoft.com/office/drawing/2017/decorative" val="1"/>
+              </a:ext>
+            </a:extLst>
+          </p:cNvPr>
+          <p:cNvSpPr>
+            <a:spLocks noGrp="1" noRot="1" noChangeAspect="1" noMove="1" noResize="1" noEditPoints="1" noAdjustHandles="1" noChangeArrowheads="1" noChangeShapeType="1" noTextEdit="1"/>
+          </p:cNvSpPr>
+          <p:nvPr>
+            <p:extLst>
+              <p:ext uri="{386F3935-93C4-4BCD-93E2-E3B085C9AB24}">
+                <p16:designElem xmlns:p16="http://schemas.microsoft.com/office/powerpoint/2015/main" val="1"/>
+              </p:ext>
+            </p:extLst>
+          </p:nvPr>
+        </p:nvSpPr>
+        <p:spPr>
+          <a:xfrm>
+            <a:off x="0" y="0"/>
+            <a:ext cx="2013557" cy="6858000"/>
+          </a:xfrm>
+          <a:prstGeom prst="rect">
+            <a:avLst/>
+          </a:prstGeom>
+          <a:solidFill>
+            <a:srgbClr val="7F7F7F"/>
+          </a:solidFill>
+          <a:ln>
+            <a:noFill/>
+          </a:ln>
+        </p:spPr>
+        <p:style>
+          <a:lnRef idx="2">
+            <a:schemeClr val="accent1">
+              <a:shade val="50000"/>
+            </a:schemeClr>
+          </a:lnRef>
+          <a:fillRef idx="1">
+            <a:schemeClr val="accent1"/>
+          </a:fillRef>
+          <a:effectRef idx="0">
+            <a:schemeClr val="accent1"/>
+          </a:effectRef>
+          <a:fontRef idx="minor">
+            <a:schemeClr val="lt1"/>
+          </a:fontRef>
+        </p:style>
+        <p:txBody>
+          <a:bodyPr rtlCol="0" anchor="ctr"/>
+          <a:lstStyle/>
+          <a:p>
+            <a:pPr algn="ctr"/>
+            <a:endParaRPr lang="en-US"/>
+          </a:p>
+        </p:txBody>
+      </p:sp>
+      <p:sp>
+        <p:nvSpPr>
+          <p:cNvPr id="2" name="Title 1">
+            <a:extLst>
+              <a:ext uri="{FF2B5EF4-FFF2-40B4-BE49-F238E27FC236}">
+                <a16:creationId xmlns:a16="http://schemas.microsoft.com/office/drawing/2014/main" id="{29B58D0B-30E3-49BB-8913-49B1168A4CDC}"/>
+              </a:ext>
+            </a:extLst>
+          </p:cNvPr>
+          <p:cNvSpPr>
+            <a:spLocks noGrp="1"/>
+          </p:cNvSpPr>
+          <p:nvPr>
+            <p:ph type="title"/>
+          </p:nvPr>
+        </p:nvSpPr>
+        <p:spPr>
+          <a:xfrm>
+            <a:off x="640080" y="2074363"/>
+            <a:ext cx="2752354" cy="2709275"/>
+          </a:xfrm>
+          <a:prstGeom prst="ellipse">
+            <a:avLst/>
+          </a:prstGeom>
+          <a:solidFill>
+            <a:srgbClr val="262626"/>
+          </a:solidFill>
+          <a:ln w="174625" cmpd="thinThick">
+            <a:solidFill>
+              <a:srgbClr val="262626"/>
+            </a:solidFill>
+          </a:ln>
+        </p:spPr>
+        <p:txBody>
+          <a:bodyPr vert="horz" lIns="91440" tIns="45720" rIns="91440" bIns="45720" rtlCol="0" anchor="ctr">
+            <a:normAutofit/>
+          </a:bodyPr>
+          <a:lstStyle/>
+          <a:p>
+            <a:pPr algn="ctr"/>
+            <a:r>
+              <a:rPr lang="en-US" altLang="zh-CN" sz="2600" kern="1200" dirty="0">
+                <a:solidFill>
+                  <a:srgbClr val="FFFFFF"/>
+                </a:solidFill>
+                <a:latin typeface="+mj-lt"/>
+                <a:ea typeface="等线 Light"/>
+                <a:cs typeface="+mj-cs"/>
+              </a:rPr>
+              <a:t>Our design</a:t>
+            </a:r>
+            <a:br>
+              <a:rPr lang="en-US" altLang="zh-CN" sz="2600" dirty="0">
+                <a:solidFill>
+                  <a:srgbClr val="FFFFFF"/>
+                </a:solidFill>
+                <a:ea typeface="等线 Light"/>
+              </a:rPr>
+            </a:br>
+            <a:r>
+              <a:rPr lang="en-US" altLang="zh-CN" sz="2600" dirty="0">
+                <a:solidFill>
+                  <a:srgbClr val="FFFFFF"/>
+                </a:solidFill>
+                <a:ea typeface="等线 Light"/>
+                <a:cs typeface="Calibri Light"/>
+              </a:rPr>
+              <a:t>(</a:t>
+            </a:r>
+            <a:r>
+              <a:rPr lang="en-US" altLang="zh-CN" sz="2600" dirty="0" err="1">
+                <a:solidFill>
+                  <a:srgbClr val="FFFFFF"/>
+                </a:solidFill>
+                <a:ea typeface="等线 Light"/>
+                <a:cs typeface="Calibri Light"/>
+              </a:rPr>
+              <a:t>SortShuffleManager</a:t>
+            </a:r>
+            <a:r>
+              <a:rPr lang="en-US" altLang="zh-CN" sz="2600" dirty="0">
+                <a:solidFill>
+                  <a:srgbClr val="FFFFFF"/>
+                </a:solidFill>
+                <a:ea typeface="等线 Light"/>
+                <a:cs typeface="Calibri Light"/>
+              </a:rPr>
+              <a:t>)</a:t>
+            </a:r>
+            <a:endParaRPr lang="en-US" sz="2600" kern="1200" dirty="0">
+              <a:solidFill>
+                <a:srgbClr val="FFFFFF"/>
+              </a:solidFill>
+              <a:latin typeface="+mj-lt"/>
+              <a:ea typeface="+mj-ea"/>
+              <a:cs typeface="+mj-cs"/>
+            </a:endParaRPr>
+          </a:p>
+        </p:txBody>
+      </p:sp>
+      <p:sp>
+        <p:nvSpPr>
+          <p:cNvPr id="4" name="TextBox 3">
+            <a:extLst>
+              <a:ext uri="{FF2B5EF4-FFF2-40B4-BE49-F238E27FC236}">
+                <a16:creationId xmlns:a16="http://schemas.microsoft.com/office/drawing/2014/main" id="{2E7EBC9A-DD55-4E80-846B-2A51D7D58B2F}"/>
+              </a:ext>
+            </a:extLst>
+          </p:cNvPr>
+          <p:cNvSpPr txBox="1"/>
+          <p:nvPr/>
+        </p:nvSpPr>
+        <p:spPr>
+          <a:xfrm>
+            <a:off x="1524000" y="1525638"/>
+            <a:ext cx="9144000" cy="420001"/>
+          </a:xfrm>
+          <a:prstGeom prst="rect">
+            <a:avLst/>
+          </a:prstGeom>
+        </p:spPr>
+        <p:txBody>
+          <a:bodyPr rot="0" spcFirstLastPara="0" vertOverflow="overflow" horzOverflow="overflow" vert="horz" lIns="91440" tIns="45720" rIns="91440" bIns="45720" numCol="1" spcCol="0" rtlCol="0" fromWordArt="0" anchor="t" anchorCtr="0" forceAA="0" compatLnSpc="1">
+            <a:prstTxWarp prst="textNoShape">
+              <a:avLst/>
+            </a:prstTxWarp>
+            <a:normAutofit/>
+          </a:bodyPr>
+          <a:lstStyle/>
+          <a:p>
+            <a:pPr algn="ctr">
+              <a:lnSpc>
+                <a:spcPct val="90000"/>
+              </a:lnSpc>
+              <a:spcBef>
+                <a:spcPts val="1000"/>
+              </a:spcBef>
+            </a:pPr>
+            <a:endParaRPr lang="en-US" sz="2000" b="1" kern="1200">
+              <a:solidFill>
+                <a:srgbClr val="E7E6E6"/>
+              </a:solidFill>
+              <a:latin typeface="+mn-lt"/>
+              <a:cs typeface="Calibri"/>
+            </a:endParaRPr>
+          </a:p>
+        </p:txBody>
+      </p:sp>
+      <p:pic>
+        <p:nvPicPr>
+          <p:cNvPr id="5" name="Picture 5" descr="A screenshot of a cell phone&#10;&#10;Description generated with high confidence">
+            <a:extLst>
+              <a:ext uri="{FF2B5EF4-FFF2-40B4-BE49-F238E27FC236}">
+                <a16:creationId xmlns:a16="http://schemas.microsoft.com/office/drawing/2014/main" id="{472F98FA-0BF8-45D9-996B-EDCBC3F3027F}"/>
+              </a:ext>
+            </a:extLst>
+          </p:cNvPr>
+          <p:cNvPicPr>
+            <a:picLocks noChangeAspect="1"/>
+          </p:cNvPicPr>
+          <p:nvPr/>
+        </p:nvPicPr>
+        <p:blipFill>
+          <a:blip r:embed="rId3"/>
+          <a:stretch>
+            <a:fillRect/>
+          </a:stretch>
+        </p:blipFill>
+        <p:spPr>
+          <a:xfrm>
+            <a:off x="3732363" y="789849"/>
+            <a:ext cx="7962179" cy="5220793"/>
+          </a:xfrm>
+          <a:prstGeom prst="rect">
+            <a:avLst/>
+          </a:prstGeom>
+        </p:spPr>
+      </p:pic>
+    </p:spTree>
+    <p:extLst>
+      <p:ext uri="{BB962C8B-B14F-4D97-AF65-F5344CB8AC3E}">
+        <p14:creationId xmlns:p14="http://schemas.microsoft.com/office/powerpoint/2010/main" val="1095464698"/>
       </p:ext>
     </p:extLst>
   </p:cSld>

</xml_diff>